<commit_message>
Arendt Pensar y Ref Morales
</commit_message>
<xml_diff>
--- a/assets uarm/2022 2 UARM Etica PCrit/Arendt - pensar y reflx morales - de la historia a la accion.pptx
+++ b/assets uarm/2022 2 UARM Etica PCrit/Arendt - pensar y reflx morales - de la historia a la accion.pptx
@@ -265,7 +265,7 @@
           <a:p>
             <a:fld id="{A831A0A4-EF71-4B93-B611-404935E2C533}" type="datetimeFigureOut">
               <a:rPr lang="es-PE" smtClean="0"/>
-              <a:t>13/04/2021</a:t>
+              <a:t>15/09/2022</a:t>
             </a:fld>
             <a:endParaRPr lang="es-PE"/>
           </a:p>
@@ -435,7 +435,7 @@
           <a:p>
             <a:fld id="{A831A0A4-EF71-4B93-B611-404935E2C533}" type="datetimeFigureOut">
               <a:rPr lang="es-PE" smtClean="0"/>
-              <a:t>13/04/2021</a:t>
+              <a:t>15/09/2022</a:t>
             </a:fld>
             <a:endParaRPr lang="es-PE"/>
           </a:p>
@@ -615,7 +615,7 @@
           <a:p>
             <a:fld id="{A831A0A4-EF71-4B93-B611-404935E2C533}" type="datetimeFigureOut">
               <a:rPr lang="es-PE" smtClean="0"/>
-              <a:t>13/04/2021</a:t>
+              <a:t>15/09/2022</a:t>
             </a:fld>
             <a:endParaRPr lang="es-PE"/>
           </a:p>
@@ -785,7 +785,7 @@
           <a:p>
             <a:fld id="{A831A0A4-EF71-4B93-B611-404935E2C533}" type="datetimeFigureOut">
               <a:rPr lang="es-PE" smtClean="0"/>
-              <a:t>13/04/2021</a:t>
+              <a:t>15/09/2022</a:t>
             </a:fld>
             <a:endParaRPr lang="es-PE"/>
           </a:p>
@@ -1031,7 +1031,7 @@
           <a:p>
             <a:fld id="{A831A0A4-EF71-4B93-B611-404935E2C533}" type="datetimeFigureOut">
               <a:rPr lang="es-PE" smtClean="0"/>
-              <a:t>13/04/2021</a:t>
+              <a:t>15/09/2022</a:t>
             </a:fld>
             <a:endParaRPr lang="es-PE"/>
           </a:p>
@@ -1263,7 +1263,7 @@
           <a:p>
             <a:fld id="{A831A0A4-EF71-4B93-B611-404935E2C533}" type="datetimeFigureOut">
               <a:rPr lang="es-PE" smtClean="0"/>
-              <a:t>13/04/2021</a:t>
+              <a:t>15/09/2022</a:t>
             </a:fld>
             <a:endParaRPr lang="es-PE"/>
           </a:p>
@@ -1630,7 +1630,7 @@
           <a:p>
             <a:fld id="{A831A0A4-EF71-4B93-B611-404935E2C533}" type="datetimeFigureOut">
               <a:rPr lang="es-PE" smtClean="0"/>
-              <a:t>13/04/2021</a:t>
+              <a:t>15/09/2022</a:t>
             </a:fld>
             <a:endParaRPr lang="es-PE"/>
           </a:p>
@@ -1748,7 +1748,7 @@
           <a:p>
             <a:fld id="{A831A0A4-EF71-4B93-B611-404935E2C533}" type="datetimeFigureOut">
               <a:rPr lang="es-PE" smtClean="0"/>
-              <a:t>13/04/2021</a:t>
+              <a:t>15/09/2022</a:t>
             </a:fld>
             <a:endParaRPr lang="es-PE"/>
           </a:p>
@@ -1843,7 +1843,7 @@
           <a:p>
             <a:fld id="{A831A0A4-EF71-4B93-B611-404935E2C533}" type="datetimeFigureOut">
               <a:rPr lang="es-PE" smtClean="0"/>
-              <a:t>13/04/2021</a:t>
+              <a:t>15/09/2022</a:t>
             </a:fld>
             <a:endParaRPr lang="es-PE"/>
           </a:p>
@@ -2120,7 +2120,7 @@
           <a:p>
             <a:fld id="{A831A0A4-EF71-4B93-B611-404935E2C533}" type="datetimeFigureOut">
               <a:rPr lang="es-PE" smtClean="0"/>
-              <a:t>13/04/2021</a:t>
+              <a:t>15/09/2022</a:t>
             </a:fld>
             <a:endParaRPr lang="es-PE"/>
           </a:p>
@@ -2373,7 +2373,7 @@
           <a:p>
             <a:fld id="{A831A0A4-EF71-4B93-B611-404935E2C533}" type="datetimeFigureOut">
               <a:rPr lang="es-PE" smtClean="0"/>
-              <a:t>13/04/2021</a:t>
+              <a:t>15/09/2022</a:t>
             </a:fld>
             <a:endParaRPr lang="es-PE"/>
           </a:p>
@@ -2586,7 +2586,7 @@
           <a:p>
             <a:fld id="{A831A0A4-EF71-4B93-B611-404935E2C533}" type="datetimeFigureOut">
               <a:rPr lang="es-PE" smtClean="0"/>
-              <a:t>13/04/2021</a:t>
+              <a:t>15/09/2022</a:t>
             </a:fld>
             <a:endParaRPr lang="es-PE"/>
           </a:p>
@@ -2991,9 +2991,52 @@
           <a:chExt cx="0" cy="0"/>
         </a:xfrm>
       </p:grpSpPr>
+      <p:sp>
+        <p:nvSpPr>
+          <p:cNvPr id="7" name="Rectángulo 6"/>
+          <p:cNvSpPr/>
+          <p:nvPr/>
+        </p:nvSpPr>
+        <p:spPr>
+          <a:xfrm>
+            <a:off x="0" y="-21743"/>
+            <a:ext cx="12192000" cy="6879743"/>
+          </a:xfrm>
+          <a:prstGeom prst="rect">
+            <a:avLst/>
+          </a:prstGeom>
+          <a:solidFill>
+            <a:schemeClr val="tx1"/>
+          </a:solidFill>
+        </p:spPr>
+        <p:style>
+          <a:lnRef idx="2">
+            <a:schemeClr val="accent1">
+              <a:shade val="50000"/>
+            </a:schemeClr>
+          </a:lnRef>
+          <a:fillRef idx="1">
+            <a:schemeClr val="accent1"/>
+          </a:fillRef>
+          <a:effectRef idx="0">
+            <a:schemeClr val="accent1"/>
+          </a:effectRef>
+          <a:fontRef idx="minor">
+            <a:schemeClr val="lt1"/>
+          </a:fontRef>
+        </p:style>
+        <p:txBody>
+          <a:bodyPr rtlCol="0" anchor="ctr"/>
+          <a:lstStyle/>
+          <a:p>
+            <a:pPr algn="ctr"/>
+            <a:endParaRPr lang="es-PE"/>
+          </a:p>
+        </p:txBody>
+      </p:sp>
       <p:pic>
         <p:nvPicPr>
-          <p:cNvPr id="4" name="Imagen 3"/>
+          <p:cNvPr id="6" name="Imagen 5"/>
           <p:cNvPicPr>
             <a:picLocks noChangeAspect="1"/>
           </p:cNvPicPr>
@@ -3007,14 +3050,167 @@
         </p:blipFill>
         <p:spPr>
           <a:xfrm>
-            <a:off x="1955345" y="454284"/>
-            <a:ext cx="8737535" cy="5715530"/>
+            <a:off x="966019" y="-21743"/>
+            <a:ext cx="10338619" cy="6879743"/>
           </a:xfrm>
           <a:prstGeom prst="rect">
             <a:avLst/>
           </a:prstGeom>
         </p:spPr>
       </p:pic>
+      <p:sp>
+        <p:nvSpPr>
+          <p:cNvPr id="2" name="CuadroTexto 1"/>
+          <p:cNvSpPr txBox="1"/>
+          <p:nvPr/>
+        </p:nvSpPr>
+        <p:spPr>
+          <a:xfrm>
+            <a:off x="1401097" y="7937"/>
+            <a:ext cx="9055510" cy="6001643"/>
+          </a:xfrm>
+          <a:prstGeom prst="rect">
+            <a:avLst/>
+          </a:prstGeom>
+          <a:noFill/>
+        </p:spPr>
+        <p:txBody>
+          <a:bodyPr wrap="square" rtlCol="0">
+            <a:spAutoFit/>
+          </a:bodyPr>
+          <a:lstStyle/>
+          <a:p>
+            <a:pPr algn="ctr"/>
+            <a:r>
+              <a:rPr lang="es-PE" sz="4800" dirty="0" smtClean="0">
+                <a:solidFill>
+                  <a:schemeClr val="bg1"/>
+                </a:solidFill>
+              </a:rPr>
+              <a:t>Hannah </a:t>
+            </a:r>
+            <a:r>
+              <a:rPr lang="es-PE" sz="4800" dirty="0" err="1" smtClean="0">
+                <a:solidFill>
+                  <a:schemeClr val="bg1"/>
+                </a:solidFill>
+              </a:rPr>
+              <a:t>Arendt</a:t>
+            </a:r>
+            <a:endParaRPr lang="es-PE" sz="4800" dirty="0" smtClean="0">
+              <a:solidFill>
+                <a:schemeClr val="bg1"/>
+              </a:solidFill>
+            </a:endParaRPr>
+          </a:p>
+          <a:p>
+            <a:pPr algn="ctr"/>
+            <a:endParaRPr lang="es-PE" sz="4800" dirty="0" smtClean="0">
+              <a:solidFill>
+                <a:schemeClr val="bg1"/>
+              </a:solidFill>
+            </a:endParaRPr>
+          </a:p>
+          <a:p>
+            <a:pPr algn="ctr"/>
+            <a:r>
+              <a:rPr lang="es-PE" sz="4800" dirty="0" smtClean="0">
+                <a:solidFill>
+                  <a:schemeClr val="bg1"/>
+                </a:solidFill>
+              </a:rPr>
+              <a:t>De la historia a la acción</a:t>
+            </a:r>
+          </a:p>
+          <a:p>
+            <a:pPr algn="ctr"/>
+            <a:endParaRPr lang="es-PE" sz="4800" dirty="0">
+              <a:solidFill>
+                <a:schemeClr val="bg1"/>
+              </a:solidFill>
+            </a:endParaRPr>
+          </a:p>
+          <a:p>
+            <a:pPr algn="ctr"/>
+            <a:endParaRPr lang="es-PE" sz="4800" dirty="0" smtClean="0">
+              <a:solidFill>
+                <a:schemeClr val="bg1"/>
+              </a:solidFill>
+            </a:endParaRPr>
+          </a:p>
+          <a:p>
+            <a:pPr algn="ctr"/>
+            <a:endParaRPr lang="es-PE" sz="4800" dirty="0">
+              <a:solidFill>
+                <a:schemeClr val="bg1"/>
+              </a:solidFill>
+            </a:endParaRPr>
+          </a:p>
+          <a:p>
+            <a:pPr algn="ctr"/>
+            <a:endParaRPr lang="es-PE" sz="4800" dirty="0" smtClean="0">
+              <a:solidFill>
+                <a:schemeClr val="bg1"/>
+              </a:solidFill>
+            </a:endParaRPr>
+          </a:p>
+          <a:p>
+            <a:pPr algn="ctr"/>
+            <a:r>
+              <a:rPr lang="es-PE" sz="4800" b="1" dirty="0" smtClean="0">
+                <a:solidFill>
+                  <a:schemeClr val="bg1"/>
+                </a:solidFill>
+              </a:rPr>
+              <a:t>El pensar y las reflexiones morales</a:t>
+            </a:r>
+            <a:endParaRPr lang="es-PE" sz="4800" b="1" dirty="0">
+              <a:solidFill>
+                <a:schemeClr val="bg1"/>
+              </a:solidFill>
+            </a:endParaRPr>
+          </a:p>
+        </p:txBody>
+      </p:sp>
+      <p:sp>
+        <p:nvSpPr>
+          <p:cNvPr id="5" name="AutoShape 4" descr="data:image/jpeg;base64,/9j/4AAQSkZJRgABAQAAAQABAAD/2wCEAAoHCBYWFRgWFRYYGRgaHBwaGRocGBocGhwaGhwaHBocGhocIS4lHB4rIRgYJzgmKy8xNTU1HCQ7QDs0Py40NTEBDAwMBgYGEAYGEDEdFh0xMTExMTExMTExMTExMTExMTExMTExMTExMTExMTExMTExMTExMTExMTExMTExMTExMf/AABEIALYBFAMBIgACEQEDEQH/xAAbAAABBQEBAAAAAAAAAAAAAAACAAEDBAUGB//EAEQQAAIBAgQDBQUFBQUHBQAAAAECEQADBBIhMQVBUQYiYXGREzKBobEUQlJiwQcjctHwFYKSouEWJDNTstLxF0NjdJP/xAAUAQEAAAAAAAAAAAAAAAAAAAAA/8QAFBEBAAAAAAAAAAAAAAAAAAAAAP/aAAwDAQACEQMRAD8A9PwF3uWpkyi7Dooq3aeRPU/TSqHBnDW0YbBEUf4QT+lXA4BIPPUfrQJrgWR0/Wjyd2P6mht6ieuv8vlFN7SBvrt8aDn+2eJ/3NwozMYER0In6V5Ti00zHQgKeley9pLYOGuTsqz6V4pxPFK5JgjuiPhQVmJcM23vGBtttRfZ2CAKPe1M8oFD7VUWIloGx01HWrGIDZGOvupJ5TQTINB5UUU9oaDyo4oIiKjZ6lujQ1TxN5UjNOvSgkL0Jeqv2tOrUzYpOrelBbLUOaqX2xPz+lN9sT8/pQXC1NNUjjk/NWgbYCg9aCMigIqUihIoInFR1M4qOgEUQpRRAUCFFFICiFAwFIzUls6jzFS8TGWCoGp10oK0nwpwD4+lVftDHn8qMMZ3JoLGX+pFOvw9Zqq5G/WjsuoO5oCv3MrxHIH1q1aMgVRxZl1PVB8ia0MOO6KB4pUeWlQe3cNaEt9GRPUKP0+lXbZkk/D0qlw9QyW5GgRD8So/SfWrllYkDzHxoEpiZ5fSkLfd8Tr8aH2YaSRvoPIVKrd2aDH7VmcHeHNkYDzIrwt1YzoNBqekmvcu1lj/AHO/AkhGJ8RHe+U14qUzAsBpABA28zQQKIDqFmYIM7f1FWbguFCWgCBMcxyqs6lQ4O4y8+U8qu33ZbQXQhlEHmKCzZHdHlRxTYf3R5UUUEd0aGsfjEQkia27g0NZvEFHczbUGOgn7tTWwv3ln40TsI06mpbdsEAyPHWgQW3yzDzqvdQVbCjkyg0jb0MsvyoM17Q5H1FbrjuD4VlummjA1sOO4PhQVyKEipCKYighcaVGRU7jSoYoGAogKUUQFAgKICmAogKBl3HnU/F3AQE9f0qKKl4uk29OooMT287L5Vf90Tl+JqpYXIZGp6mprzyCCTr8qCFL5ZpATptyonAgq2pOx6eVPh8PB0O/hVsWvL0oKroVyA/hI/zf61rYYd0VRxm6HwYfMVo4cdwUDxT0WWlQev8AZ6zFi3mLEsiMZY75RP6VpCyC066CPePPX+VZ3BL4dLagwURM4HKUBA+fyrUtCCR4z60AWrQAiTppuaYWO6TLanNvUhSc0EjlRq2lBm9okBwt6SQCjDfqIFeNX8PlG4ClQQo5navaOMWz9nfn3G08wfpXjfF7BBQTACfrtQUMThYLALqwB02Hxq7auAooKjUQJHQ0eJsRlVZIyAxO+vM1WwBcESpgdBO36UFu0sCIo4p18RB6dKeKCNxoaxuNDupp/UVtsKyOLAZUn+tKDFnwokQnQiB50RAJ02q6qrGrA/Ggz3sx40OY8xVq8wmBEedArkfhNBE5y6DpXQx3F8hWA7zyE10KjuL5CggihirD24AMzURWgjcVCRU7CoiKAQKKKaiAoEBRCkKICgGKuYpJT0qrFX7glPgKDFupzqqjgtA3nStG9bmRO/KqlvBPnBign9nBFEr9aMo0AEgN0qQYMmgr4kyEPi30FaOGHcFU8bayqk/iP0q9hR3BQSZaVFFKg9a7M4cJaUzLOiOT4ZFUD4RWk4Obu6aa6en61S4PPsMPG/s09Mo/0q7b3ad5+UaUElg90defnUeuu0T8uf604Jloj/X+oqRAIHlQRY//AIT/AMDfQ14Zxh3JQOuU5dp8d69xxAJQgxBB+hj9K8W7QWiSjNyUg+vKgF8UZCj3smUH4jWgwRf2cZtlbXrrprVfEuM6E7FYn0oMBbLAAkhJcjXcCNKDSwxJUEmTzqWhsRGggch0oiKAWFZfFcOzquQSRWqarsH5RFBgDh9z8H0pjwy5+H51ukP1FMUfqPSgw/7JuR7vzpLwq5zA9a2ij/iFN7F/xfKgxzwl+UD41tKkIAdwADUZw775jHlTmywOrTQOx0iojUzCoyKCJxURFTuNKhNAIohSinAoFRClSFAjWmi9weVZtTNxAKAuUmBQE2H1DRqNPhUyWTVX+0zyQ+opxxFzsg9TQWnwcsrRtVpLVZn228dlUetIYi/1Uf3f9aCTji91P4v0NFg/cFQPZuORneQDMAAVctJlEUBRSo4pUHqvAnJs2u6dLSRtzUT9K0STnEKdQZ1HLb6mqHBTGGw5/wDjQf5QR9K0rJmT8PSgGyxjVTOs6jrQNcIDDKdDG45x/OpWeCd+ugplGnn+tAOIEowj7p5jpXiPHQ4VQ7SdeX0PSvbLrZkymde6f1+leP4okhlGujQY6aUHPuxYqdxEDpT27hOUfhJ0HnW5hLKfu1A7xBLD4Vl4O2c8jUZiSOcamaDVtxyBHgd6Iigsvm1POjNAJpiKI0JoBNCac0xoAuMApY7ATWdbxV52X2CFt9gY+PLrT8fdhahd2MctvKut4Vj7Vq0gZ0QQFBJALGOXWg5zEcNxVlA5RmAjMFYFoHUHflMTtVWxxNSBmjeJG2u0/hrqeL8XZXjPaRAJZ3zMzeAVSAu41Jrh+LYVg5vIGVGIzn7skAyOoII1jnQbTtIqI1Q4ViiSUOsAFSd46f10q+RQC43qAirDCoDQCKcUqKgekKVIUBU4UUwohQEq+FSrUYqVaA1owKBRUi0BRTgUhRAUDRSp6VB6n2bcNhrEH3baesf6Vp5wra8/qKxezBjD2DyZFHx3H61sqZYnpp/OgO0ZE9fpURcAETqNPXaiRokdNfgf6NJRI89f5UD3LcpA6aedeQcTthHyjq8gnrXrpeVidTp8edeI8VfNfuDo7jyysQPpQPgCPaySNO76jSgQhM0RIeGPnOlV1fYSILCT41IlxEJUd6HnbfeguYa5IPnHpUs1VwJ7p8zVmgRpjTmhNAJoTRGmNBg8axDZ0VZkT8+lLhysUZmZFI7hLKGuBTMi2Dzk7gGtHH4QOByYbH9Kq4DhF5ryhYgmSdwmXmevOg2MD7NjbsLbf2yKFuZQshBLKWY6GJ31MnxNal7hgdSjnMCAYYQwOwJHwA6aVdv8PiAHIQDM5XuloGpuXBqFGvdGvjXOY/tlhrWYWFa6x+9EKBtGdwSR4ZT50GNw/Dj2rC2S2UBSAD70kkRG4EVZxGJRGCOwViQMp96TtI3HxrBx/aG/czAOLaEklLYKqSTJkjUk+hrHHhpQd01QGlZxAZFb8Sg+ooSaBU4pppUB0qGaU0BzRrUQo1oJQalUVCtTLQSLUgFRpUyigcU4p1WjW2aAIpVN7E9RT0HonZhJw2HHIIp/QVsokMRyOv6H9K4zA8NvWlAGKuIoAABRAABOnePjUGJ4iEeHxt4kfhVCNfEaUHdBAxJI8P50rei+WnpXnp4sg2xOJ9AKY8TtGZv4ozvqomg9Au91C0ajvfGvEuLd++5ESXcwNJ1O/jXeWeI2nXJnvwfeLNJI6T0rhWRVd33AdsvUanegpvb0CcjqKtYYhGIYSBl13gxrRY/COlu2GIAcC4hIM5SeRrQ4ZwK9cS46KWUBdSILCNcs7mKDMwbliY5sYFW7tp0MOCp6EEH51s9mML9nR8QyOVAXLKHYnVg3LaPjQ4ntPZZizWc51jOJiemtBiEnqKA5uo9K0049aYENh0k8wIjyrq8H2JsvbRzcuDMqtHd+8J6eNBwBzdflUVzEImVrrsqEwxVMxGh2Hwro8Z2ZvC+1tEYpPddvdiJ1YaVkdoezeIFl8yaASCGBBK97u6ydqArHG+Er774p/wC4FH+WD8608L254VaByWb2u/cBJjqWevJYpUHpfab9oGHxGGuWLNm6jXAFzMEVQMwJ91yToNvGvMSKmqN96AKajIoDQd72Mxf+7ZGdLYV2ALNBKnvaQPxEjWrvF+FqwNxO6QJZRswH3h0P1+vJdllGZ8/uMFB65lYMCI8Mwj81doiMkMWYqRIBAzHwIFBzHs/E0vZ+JrYbhU3kXVEuBiuk5SqlivjyjwNRLw4FioLaI7TIg5VLQJA6RG9Bmez8T60+TxPrWm/DwBbYZijojZp0zOssNByM+lNe4a3t/ZJqJAUkwCcoJGYgDnQZoTxPrRhPE+tdF/sleBhmQeGdZ9KLE9mGQd26jt95ADnU+IPLxoOeW34t61Mlrxb1qzhrH772TbgGRMGQJirdrC++GCLlR395ie6uY6Tpz3oKC2fFvWpks/mb1qNMQv4h61Ol9fxD1oHWz+ZvWpVsfmf/ABUlvD8Q9RUi3l/EPUUDfZ/zP/ipVL7YfiHyp6DlrfGcOffe7P5kBPqHNTYbjthD77sOYyEfPNpXP+yw34r3wFv9YoW+zD/nEc5e2DHh3T40HVP2mw06LeieQTbwzHetbgna7ABwl3D3SjMJuOykoI/CgEjqNa4bjOCS1cCW3LqVVgTE6zoQAI2qtaVulB7YO03ChKi6gB5ezb6kU69peEyCLliepQD10rx627DSB/eCn61aw1pS2qoTGx2/yg60Hr+J7UcKd0drtlmt6Ixz90eACxVle2mBBEYm1A5d4CI0+7XiuJSyGk5RE6Aae9POPKiXh6s3dw92CU3UqoDtlQkxopOgO2lB7SnazBOjI2ItsCCG96Cp5QR51xD8NwbOxbGpqSQEQzGsCDv8KqYLhL4ZMSj4ZHcGy4UKLghi4g9PdmB1FDh8d3mIwyKwRwQECmCCpA+OkeNAa2sIjoyYnOAwJVhlzAaxPKvQj2yw2RSt1AYHdLDTw+FeG2ODXXjJhnPxgHTqdKjThTm4qNadJOpYNEASSDEH4Gg9vxvae2VBtFXkxCtp+aTtpWVf4lnVngOQPdDaAHcaAgVxOIAVFVe6oZFAHIFwp+Op1rf4Tih7RECqv7tXMCJIA1OsEkwTQcv/ALCYkqz9xECO4BLM7BAMoVQsknMB+mwNXjvZK5hbQuO6NLhMqBtJBM5jE7Rtzr1q3ji6FFALAALsJJAMEkaDQ/KsziFl3fJnKkQwhoAgEHUee9B4yEOYKZBkAgjUT4Vp3uFIpIJukgkHuKNv7x510PbDhGJZ7T2ke4LagNlBZlcENmgamdNp901nYvE4j2rIzXA8wVzNIkFtgdOXwoMfivDjayGHAdCwzgAmGKmIPhzg1msK6riPBrz+zzvoFPeaSTLE90cxrEk8qkwnAbS6sGc/m93/AAj9ZoMTh2NKpltq5YA7CZZjEyNgB1611/DkbJGpIYySdfdB+gJ8gaz8epAAt22ETGVIHoBVLBPiGdM6OqK6uYmSy+7ryGvxoO44eyO6o7QJ94QCrcmUnbp5E11+GwVq0sIup3JALH49K4hcUjznQhtwRIDRrBA2PjQ8R4ribayl5jlGodUzAaMATlBiII+dB1vHuEo9svkAuKO4RGpnZhsV1/lWJw0ulz2JQiWVmYgZNFnKHgwATr1y1yV7tdjDtdAPUJbn1K1mNx3EzPtSCdyEtg+oWaD1PEYpFgHeTt/F8pqK27Jcd1cuDkME88kFVEwBP/mvJsTxbEPq164f77foaucF4w9p8zkurDKwYlvEEEmdD4xQel4u3bvKWuBEeCVcL31Cg5jI3EAzrtVbhTWUdwSXLrlMhSGVdDE76kTqfKuTudrkUhjh37swxSV11OueD50sF2uTa3ZumOQXMBJmBNyFE8hQbHHeD20uA2gFRohSHMNzAMHSfSqh4SwjuA/Dn8R41SxHbpfde3dBHIrlPxGcVCvbK3AARxPLz/v0GoeFMP8A2/p/U0a8Kf8A5Lf4DQHiLMumkjT3v+6rbcRgQi5R1Op/r1oKw4efwfKnpziGOuY+tKg82bDAORrG48RQ4+0EfKu0AiddxNauHx+GE51Zx0IKx4ypJ9IrVwvGsAjZvslhj+f7Q/yYkUGRiMKos+1JbOQskkRqQPStDhHDPaWi6o7kKx0zRptsK6XDftCspASxhUAEALZuD6LVxf2oJzFr/wDK6fqRQccvAsQ5bJYYiBlOZQJjUyzDr8q63gnCbVu1nu4a37RYmMQzSIEsczQus6CRRH9p1kfcDH8uHyn1a6Kycd+0O2wYLh3bNM5nCjXlAzQKDQwPFMKjZrOHDMZnIAznmO8iQI1iTPyre/2tussHCXxI3n6fu68zfta33MPaTzLt8pAPpT4XtzjEaVdFWe8ioiBhzEgSPOaD0wdor7nKuHfMJ0ac2uw0A6UWJxl50yPbcMYyqEzLG2pMkkAkxK7CuSTtpkAA9moiRq4MNruDqfHffWpl7exysH+L2jf9Tmgl4hwu+qNafNctEghltLaDa5oyhyRBJHSAI5Go+BW7lsOz2ZUOYQqzEjTckRO1TJ+0p1EL9mUdAlwfRqL/ANT3/HY/wXP+6g1b1lWRXWzk2AU21zAzMuMrAkeA6VPjwEtHMYAWBIjXUABR+grnb/7SnYQWtR+VLo+avrVRe2iAEFbDTvnt3X5z95jQdBgeIoWAzogLRmYMqiACW1G3jz1q1Yxc5bgV2Qq65ghhobRhI92F0Nce/a6yy5SlkiZ/4d3eIOubTSrFrtuDGUW2yiNLV1oHqaDS7RXSUGQPO/cZQwkDUd1hOm2/OrVmzbOIRybbFFCB2c29IgkqX1bqYrnn7dIwAPsyBt+6f+dV37WWScxS1PX2L/zoOw41wMYhkIxKWhLZ2RnYMNMoGwH3jqaoW+wqlsr45+pZVUgjlAZpGn8Qrn37X2mglLRjabJMetRP2rsn7lqf/rgn50HWN+zjD5c32vEmN/dafhl05c6fC/s4wuh9vivEE2wf+gxzrB4J2pw1tHL28zlpUJaRREeMAc6fHftFcaWsOoHIu5P+VQPrQdrwrsrgsOxhrzlhlOdgQR5KoqHHcBR7jZEtJYYAFQjC77sN+8DRqfCvMr3b7GvPfVB0RAPm0n51ktx28xJuu9wk/euPC/wrMCg9NxfZ3h6aO6JvvcbPPKO/rz5Vy3aWxg1VBhC7PmOcnORljSMwg69K59eLsxC5nEkDrE+AOtX8ZZVCM2JQyJhRcLDwIjT4mgzzbf8ACfQ095/ZqJAztyImF6x1qZWQLmVXuNyJULbHjuWb5Vn31dmLMDJ8Pp0oJbPE7i+6wHkorR4LxJ7R7iprMgpI1EHTyrGW0eh9K0cBaM7Ggm4zcZ1zOoIWYIEZSYGkROvWaz2woC4ckQXaG13XMoXy0NaOKtFrbKBqSD/mH8qjxdlsuGAUnKVmBtGTf0oOrwmFZyFQVrXeAuq5gQfCs7heJCMSWyitX+0Q0MXIynbr40FH7Dc/AaVbNjitsic60qDxClSIpUCp6anAoFSpRSigeaU0mA5beNNQSo/USOm3z5VesYi0DpaI6nPmMeAYQKzxFS22E7fOg0eGpmd1Vcw3Hd1jlPStLE8E2d3RI173/mqNniTqmRCFGvuxm6mTvWce+GaTPjqTQaPH79t3VkuLKhRlCvBy9DEVn3rxY2mBkiFPnm+cipsThUUgLOqTqeZFa/ZPHWsMl3Euge4gRbAIEZ2DFj4QAsnoY50GZxKbLFLigs0MUaQVnUZwNQSIOWQYImNqnwHbDFWly23CJtlRUQD4KvidTr41g377O7OzFmYlmY7liZJoZ1oOsw3GExDZcQgdj94gC5prpcUZtN4MjwqS/wBlyy5rDh+iOMreQde6x8wlcklwqQymCpBBHI13fZziGZVcgAE5XjZX0gxyUyD4THSg4Z1IJBBBBggiCCDqCOtXBbUDM57/AE6CNvOtjtxgFt3Edd7gdm/iDD/urncQTnaDz2oGTEMOfyFSpi/xjMOk5fnBqFXDaHQ0bXGGTY5DIkSDqDB6jTagmS/bAI9kYbQ/vDyM/hqZ8VaYQbRG5kOsyfNKr2gC1yBAK5gN4GZCBJ30O9S50yQNWk6QZ5eHnQSpiLawUQhgIzFgx8/dGutVpWd2+Rq/2fvoucOqGY0b9K6JPYHe2F22AoLdvss+GVHulcrKSQGkjSRMbb1zGOxjq5CHSa6iVYQrz4H5UbYQR7in4Cg4+zxq4pnKjfxLIqTE8fuv9xF/gSP1ronsqD7o9KJbS/hHpQciMVfYwoYnwU01v7S7FVVyeYAM16JwzFqjQwAHWKp4ntGA5ypESshfeoOb7M23e4yuGiNyDpW3eG4jYkelT/22NAqMTIJGWDFavF7tlrKFNLrEl15KsGBtE7fOg5aw4AI8TSpPgXncetKg4pLZM67UMakdKlKFWgjlOv8AKmw/3hEkjTzkGfrQK5by79AfWk6ER4ifWrGMskETAOTN8By86rZfdnT6fCgJbc/L50123lJEzFWcJbDFpdVgCA2bvSQIGUHXWfIGq98CSRAGY7EkeEE6+utAYsdzPy2+NHZw6lC2sgHy5R9as4G9aACXg7JuMrRBOhPnTXriKzpbJKNqhaM0aHWOe4oM9hqY5bVYw2wOnx86gY7+dSYd9IjTWgLDPGdiYkETE6nl4edTYEQvnUCL3GJ20A8yZ+g+dGbzQAIEADQdKC7faXX+GKz8Y8KqA6CZ31Y7k+gHwqy76qfy1nXnJO/9f1NAK00UbbDypooEdq3ux+PCXGtuJRwZHKVBJ36rPoKwkoVcq0gkEbEbig7LtmndsMrZ7ZD5GnvQckq3iI3rG4zwplS3fXVLirmP4XiCD4GJHxFUFxTsoRmZlUkqpMhS3vQOU1axfE7jItkucigQo2P3teup8qDMLTuP51KqEqeYGtRFaNW0PiI+mtBYwCyzCYlDryGq9KkGCglswYamNR6a61HgiO9M6I4MbwR/ofWnS4g5v6Kf1FBXeDmI2kQPM+OtbFvCtcCOt1EhFzBnyyySmg/hVfWsaB3t/DTx0qW5bGRDrJB5aGGYbk+W2nxmg0uHcQYsVe4igc25+UVct9oFUxJ8xt6Vy5pmoO9w/Glb7yn5GraYlDuI8q84Q1at4112Y0Hfm2rEEPQB7qNKqpAM61yFrjjj3hNT3+N5kgFlPgaDqH4w7vmKqs6aVZx+DVUS7nBDkiJ10n+VcEvEIG59aR4l50HRe1/NSrm/7R86VBsdqQsIwBn3dTOmlc/hmAaSJ0iJjnTUqDqMVwC0cO95CwKrmZWiI/KVjXzFcoNYpUqCW25BkbxQPsD1pUqC3bwJIBkaiaj9lBHn8op6VBXYd2fzfoamtqBbnmdPnSpUBXX7iKPM+Z0/SmIpUqCf2ebnELP9etZsz6UqVAuVJaVKgkjY+MVHeGtKlQPY3orp73wH0p6VAJNXMNhc+ggQJ+lKlQRYVYzjojfJWFJUB5Dc8v600pUqAEX39BopO58Bp461P7MmwrE6BiAOmaJ+lKlQUXFORoKVKgJFGs7ROlS3rADQDOgMkQdQD1PWlSoICKEinpUDUk3pUqAnGtKlSoP/2Q=="/>
+          <p:cNvSpPr>
+            <a:spLocks noChangeAspect="1" noChangeArrowheads="1"/>
+          </p:cNvSpPr>
+          <p:nvPr/>
+        </p:nvSpPr>
+        <p:spPr bwMode="auto">
+          <a:xfrm>
+            <a:off x="155575" y="-144463"/>
+            <a:ext cx="304800" cy="304801"/>
+          </a:xfrm>
+          <a:prstGeom prst="rect">
+            <a:avLst/>
+          </a:prstGeom>
+          <a:noFill/>
+          <a:extLst>
+            <a:ext uri="{909E8E84-426E-40DD-AFC4-6F175D3DCCD1}">
+              <a14:hiddenFill xmlns:a14="http://schemas.microsoft.com/office/drawing/2010/main">
+                <a:solidFill>
+                  <a:srgbClr val="FFFFFF"/>
+                </a:solidFill>
+              </a14:hiddenFill>
+            </a:ext>
+          </a:extLst>
+        </p:spPr>
+        <p:txBody>
+          <a:bodyPr vert="horz" wrap="square" lIns="91440" tIns="45720" rIns="91440" bIns="45720" numCol="1" anchor="t" anchorCtr="0" compatLnSpc="1">
+            <a:prstTxWarp prst="textNoShape">
+              <a:avLst/>
+            </a:prstTxWarp>
+          </a:bodyPr>
+          <a:lstStyle/>
+          <a:p>
+            <a:endParaRPr lang="es-PE"/>
+          </a:p>
+        </p:txBody>
+      </p:sp>
     </p:spTree>
     <p:extLst>
       <p:ext uri="{BB962C8B-B14F-4D97-AF65-F5344CB8AC3E}">
@@ -3069,6 +3265,207 @@
           </a:prstGeom>
         </p:spPr>
       </p:pic>
+      <p:sp>
+        <p:nvSpPr>
+          <p:cNvPr id="3" name="Rectángulo 2"/>
+          <p:cNvSpPr/>
+          <p:nvPr/>
+        </p:nvSpPr>
+        <p:spPr>
+          <a:xfrm>
+            <a:off x="2429691" y="1267097"/>
+            <a:ext cx="7367452" cy="875212"/>
+          </a:xfrm>
+          <a:prstGeom prst="rect">
+            <a:avLst/>
+          </a:prstGeom>
+          <a:noFill/>
+          <a:ln>
+            <a:solidFill>
+              <a:srgbClr val="FF0000"/>
+            </a:solidFill>
+          </a:ln>
+        </p:spPr>
+        <p:style>
+          <a:lnRef idx="2">
+            <a:schemeClr val="accent1">
+              <a:shade val="50000"/>
+            </a:schemeClr>
+          </a:lnRef>
+          <a:fillRef idx="1">
+            <a:schemeClr val="accent1"/>
+          </a:fillRef>
+          <a:effectRef idx="0">
+            <a:schemeClr val="accent1"/>
+          </a:effectRef>
+          <a:fontRef idx="minor">
+            <a:schemeClr val="lt1"/>
+          </a:fontRef>
+        </p:style>
+        <p:txBody>
+          <a:bodyPr rot="0" spcFirstLastPara="0" vertOverflow="overflow" horzOverflow="overflow" vert="horz" wrap="square" lIns="91440" tIns="45720" rIns="91440" bIns="45720" numCol="1" spcCol="0" rtlCol="0" fromWordArt="0" anchor="ctr" anchorCtr="0" forceAA="0" compatLnSpc="1">
+            <a:prstTxWarp prst="textNoShape">
+              <a:avLst/>
+            </a:prstTxWarp>
+            <a:noAutofit/>
+          </a:bodyPr>
+          <a:lstStyle/>
+          <a:p>
+            <a:pPr algn="ctr"/>
+            <a:endParaRPr lang="es-PE"/>
+          </a:p>
+        </p:txBody>
+      </p:sp>
+      <p:sp>
+        <p:nvSpPr>
+          <p:cNvPr id="4" name="Rectángulo 3"/>
+          <p:cNvSpPr/>
+          <p:nvPr/>
+        </p:nvSpPr>
+        <p:spPr>
+          <a:xfrm>
+            <a:off x="2429691" y="2821577"/>
+            <a:ext cx="7367452" cy="1097280"/>
+          </a:xfrm>
+          <a:prstGeom prst="rect">
+            <a:avLst/>
+          </a:prstGeom>
+          <a:noFill/>
+          <a:ln>
+            <a:solidFill>
+              <a:srgbClr val="FF0000"/>
+            </a:solidFill>
+          </a:ln>
+        </p:spPr>
+        <p:style>
+          <a:lnRef idx="2">
+            <a:schemeClr val="accent1">
+              <a:shade val="50000"/>
+            </a:schemeClr>
+          </a:lnRef>
+          <a:fillRef idx="1">
+            <a:schemeClr val="accent1"/>
+          </a:fillRef>
+          <a:effectRef idx="0">
+            <a:schemeClr val="accent1"/>
+          </a:effectRef>
+          <a:fontRef idx="minor">
+            <a:schemeClr val="lt1"/>
+          </a:fontRef>
+        </p:style>
+        <p:txBody>
+          <a:bodyPr rot="0" spcFirstLastPara="0" vertOverflow="overflow" horzOverflow="overflow" vert="horz" wrap="square" lIns="91440" tIns="45720" rIns="91440" bIns="45720" numCol="1" spcCol="0" rtlCol="0" fromWordArt="0" anchor="ctr" anchorCtr="0" forceAA="0" compatLnSpc="1">
+            <a:prstTxWarp prst="textNoShape">
+              <a:avLst/>
+            </a:prstTxWarp>
+            <a:noAutofit/>
+          </a:bodyPr>
+          <a:lstStyle/>
+          <a:p>
+            <a:pPr algn="ctr"/>
+            <a:endParaRPr lang="es-PE"/>
+          </a:p>
+        </p:txBody>
+      </p:sp>
+      <p:sp>
+        <p:nvSpPr>
+          <p:cNvPr id="5" name="Rectángulo 4"/>
+          <p:cNvSpPr/>
+          <p:nvPr/>
+        </p:nvSpPr>
+        <p:spPr>
+          <a:xfrm>
+            <a:off x="4396705" y="5805017"/>
+            <a:ext cx="5400438" cy="481641"/>
+          </a:xfrm>
+          <a:prstGeom prst="rect">
+            <a:avLst/>
+          </a:prstGeom>
+          <a:solidFill>
+            <a:schemeClr val="bg1"/>
+          </a:solidFill>
+          <a:ln>
+            <a:solidFill>
+              <a:schemeClr val="bg1"/>
+            </a:solidFill>
+          </a:ln>
+        </p:spPr>
+        <p:style>
+          <a:lnRef idx="2">
+            <a:schemeClr val="accent1">
+              <a:shade val="50000"/>
+            </a:schemeClr>
+          </a:lnRef>
+          <a:fillRef idx="1">
+            <a:schemeClr val="accent1"/>
+          </a:fillRef>
+          <a:effectRef idx="0">
+            <a:schemeClr val="accent1"/>
+          </a:effectRef>
+          <a:fontRef idx="minor">
+            <a:schemeClr val="lt1"/>
+          </a:fontRef>
+        </p:style>
+        <p:txBody>
+          <a:bodyPr rtlCol="0" anchor="ctr"/>
+          <a:lstStyle/>
+          <a:p>
+            <a:pPr algn="ctr"/>
+            <a:endParaRPr lang="es-PE"/>
+          </a:p>
+        </p:txBody>
+      </p:sp>
+      <p:sp>
+        <p:nvSpPr>
+          <p:cNvPr id="6" name="Rectángulo 5"/>
+          <p:cNvSpPr/>
+          <p:nvPr/>
+        </p:nvSpPr>
+        <p:spPr>
+          <a:xfrm>
+            <a:off x="2338251" y="4271554"/>
+            <a:ext cx="7458892" cy="587829"/>
+          </a:xfrm>
+          <a:prstGeom prst="rect">
+            <a:avLst/>
+          </a:prstGeom>
+          <a:noFill/>
+          <a:ln>
+            <a:solidFill>
+              <a:srgbClr val="FF0000"/>
+            </a:solidFill>
+          </a:ln>
+        </p:spPr>
+        <p:style>
+          <a:lnRef idx="2">
+            <a:schemeClr val="accent1">
+              <a:shade val="50000"/>
+            </a:schemeClr>
+          </a:lnRef>
+          <a:fillRef idx="1">
+            <a:schemeClr val="accent1"/>
+          </a:fillRef>
+          <a:effectRef idx="0">
+            <a:schemeClr val="accent1"/>
+          </a:effectRef>
+          <a:fontRef idx="minor">
+            <a:schemeClr val="lt1"/>
+          </a:fontRef>
+        </p:style>
+        <p:txBody>
+          <a:bodyPr rot="0" spcFirstLastPara="0" vertOverflow="overflow" horzOverflow="overflow" vert="horz" wrap="square" lIns="91440" tIns="45720" rIns="91440" bIns="45720" numCol="1" spcCol="0" rtlCol="0" fromWordArt="0" anchor="ctr" anchorCtr="0" forceAA="0" compatLnSpc="1">
+            <a:prstTxWarp prst="textNoShape">
+              <a:avLst/>
+            </a:prstTxWarp>
+            <a:noAutofit/>
+          </a:bodyPr>
+          <a:lstStyle/>
+          <a:p>
+            <a:pPr algn="ctr"/>
+            <a:endParaRPr lang="es-PE"/>
+          </a:p>
+        </p:txBody>
+      </p:sp>
     </p:spTree>
     <p:extLst>
       <p:ext uri="{BB962C8B-B14F-4D97-AF65-F5344CB8AC3E}">
@@ -3115,8 +3512,155 @@
         </p:blipFill>
         <p:spPr>
           <a:xfrm>
-            <a:off x="2177007" y="561430"/>
+            <a:off x="3613922" y="1070881"/>
             <a:ext cx="7925369" cy="4833530"/>
+          </a:xfrm>
+          <a:prstGeom prst="rect">
+            <a:avLst/>
+          </a:prstGeom>
+        </p:spPr>
+      </p:pic>
+      <p:sp>
+        <p:nvSpPr>
+          <p:cNvPr id="3" name="Rectángulo 2"/>
+          <p:cNvSpPr/>
+          <p:nvPr/>
+        </p:nvSpPr>
+        <p:spPr>
+          <a:xfrm>
+            <a:off x="6839460" y="5543760"/>
+            <a:ext cx="4699831" cy="360652"/>
+          </a:xfrm>
+          <a:prstGeom prst="rect">
+            <a:avLst/>
+          </a:prstGeom>
+          <a:solidFill>
+            <a:schemeClr val="bg1"/>
+          </a:solidFill>
+          <a:ln>
+            <a:solidFill>
+              <a:schemeClr val="bg1"/>
+            </a:solidFill>
+          </a:ln>
+        </p:spPr>
+        <p:style>
+          <a:lnRef idx="2">
+            <a:schemeClr val="accent1">
+              <a:shade val="50000"/>
+            </a:schemeClr>
+          </a:lnRef>
+          <a:fillRef idx="1">
+            <a:schemeClr val="accent1"/>
+          </a:fillRef>
+          <a:effectRef idx="0">
+            <a:schemeClr val="accent1"/>
+          </a:effectRef>
+          <a:fontRef idx="minor">
+            <a:schemeClr val="lt1"/>
+          </a:fontRef>
+        </p:style>
+        <p:txBody>
+          <a:bodyPr rtlCol="0" anchor="ctr"/>
+          <a:lstStyle/>
+          <a:p>
+            <a:pPr algn="ctr"/>
+            <a:endParaRPr lang="es-PE"/>
+          </a:p>
+        </p:txBody>
+      </p:sp>
+      <p:pic>
+        <p:nvPicPr>
+          <p:cNvPr id="4" name="Imagen 3"/>
+          <p:cNvPicPr>
+            <a:picLocks noChangeAspect="1"/>
+          </p:cNvPicPr>
+          <p:nvPr/>
+        </p:nvPicPr>
+        <p:blipFill>
+          <a:blip r:embed="rId3"/>
+          <a:stretch>
+            <a:fillRect/>
+          </a:stretch>
+        </p:blipFill>
+        <p:spPr>
+          <a:xfrm>
+            <a:off x="488359" y="370453"/>
+            <a:ext cx="2953501" cy="2607878"/>
+          </a:xfrm>
+          <a:prstGeom prst="rect">
+            <a:avLst/>
+          </a:prstGeom>
+        </p:spPr>
+      </p:pic>
+      <p:sp>
+        <p:nvSpPr>
+          <p:cNvPr id="5" name="Rectángulo 4"/>
+          <p:cNvSpPr/>
+          <p:nvPr/>
+        </p:nvSpPr>
+        <p:spPr>
+          <a:xfrm>
+            <a:off x="3775166" y="2050868"/>
+            <a:ext cx="7764125" cy="1854926"/>
+          </a:xfrm>
+          <a:prstGeom prst="rect">
+            <a:avLst/>
+          </a:prstGeom>
+          <a:noFill/>
+          <a:ln>
+            <a:solidFill>
+              <a:srgbClr val="FF0000"/>
+            </a:solidFill>
+          </a:ln>
+        </p:spPr>
+        <p:style>
+          <a:lnRef idx="2">
+            <a:schemeClr val="accent1">
+              <a:shade val="50000"/>
+            </a:schemeClr>
+          </a:lnRef>
+          <a:fillRef idx="1">
+            <a:schemeClr val="accent1"/>
+          </a:fillRef>
+          <a:effectRef idx="0">
+            <a:schemeClr val="accent1"/>
+          </a:effectRef>
+          <a:fontRef idx="minor">
+            <a:schemeClr val="lt1"/>
+          </a:fontRef>
+        </p:style>
+        <p:txBody>
+          <a:bodyPr rot="0" spcFirstLastPara="0" vertOverflow="overflow" horzOverflow="overflow" vert="horz" wrap="square" lIns="91440" tIns="45720" rIns="91440" bIns="45720" numCol="1" spcCol="0" rtlCol="0" fromWordArt="0" anchor="ctr" anchorCtr="0" forceAA="0" compatLnSpc="1">
+            <a:prstTxWarp prst="textNoShape">
+              <a:avLst/>
+            </a:prstTxWarp>
+            <a:noAutofit/>
+          </a:bodyPr>
+          <a:lstStyle/>
+          <a:p>
+            <a:pPr algn="ctr"/>
+            <a:endParaRPr lang="es-PE"/>
+          </a:p>
+        </p:txBody>
+      </p:sp>
+      <p:pic>
+        <p:nvPicPr>
+          <p:cNvPr id="6" name="Imagen 5"/>
+          <p:cNvPicPr>
+            <a:picLocks noChangeAspect="1"/>
+          </p:cNvPicPr>
+          <p:nvPr/>
+        </p:nvPicPr>
+        <p:blipFill>
+          <a:blip r:embed="rId4"/>
+          <a:stretch>
+            <a:fillRect/>
+          </a:stretch>
+        </p:blipFill>
+        <p:spPr>
+          <a:xfrm>
+            <a:off x="488358" y="3439205"/>
+            <a:ext cx="2953501" cy="2618568"/>
           </a:xfrm>
           <a:prstGeom prst="rect">
             <a:avLst/>
@@ -3169,7 +3713,7 @@
         </p:blipFill>
         <p:spPr>
           <a:xfrm>
-            <a:off x="2935605" y="386985"/>
+            <a:off x="738315" y="414281"/>
             <a:ext cx="6443528" cy="2679487"/>
           </a:xfrm>
           <a:prstGeom prst="rect">
@@ -3193,8 +3737,155 @@
         </p:blipFill>
         <p:spPr>
           <a:xfrm>
-            <a:off x="3276056" y="3249249"/>
+            <a:off x="1078766" y="3276545"/>
             <a:ext cx="5762625" cy="3076575"/>
+          </a:xfrm>
+          <a:prstGeom prst="rect">
+            <a:avLst/>
+          </a:prstGeom>
+        </p:spPr>
+      </p:pic>
+      <p:sp>
+        <p:nvSpPr>
+          <p:cNvPr id="4" name="Rectángulo 3"/>
+          <p:cNvSpPr/>
+          <p:nvPr/>
+        </p:nvSpPr>
+        <p:spPr>
+          <a:xfrm>
+            <a:off x="900752" y="818866"/>
+            <a:ext cx="6155140" cy="968991"/>
+          </a:xfrm>
+          <a:prstGeom prst="rect">
+            <a:avLst/>
+          </a:prstGeom>
+          <a:noFill/>
+          <a:ln>
+            <a:solidFill>
+              <a:srgbClr val="FF0000"/>
+            </a:solidFill>
+          </a:ln>
+        </p:spPr>
+        <p:style>
+          <a:lnRef idx="2">
+            <a:schemeClr val="accent1">
+              <a:shade val="50000"/>
+            </a:schemeClr>
+          </a:lnRef>
+          <a:fillRef idx="1">
+            <a:schemeClr val="accent1"/>
+          </a:fillRef>
+          <a:effectRef idx="0">
+            <a:schemeClr val="accent1"/>
+          </a:effectRef>
+          <a:fontRef idx="minor">
+            <a:schemeClr val="lt1"/>
+          </a:fontRef>
+        </p:style>
+        <p:txBody>
+          <a:bodyPr rot="0" spcFirstLastPara="0" vertOverflow="overflow" horzOverflow="overflow" vert="horz" wrap="square" lIns="91440" tIns="45720" rIns="91440" bIns="45720" numCol="1" spcCol="0" rtlCol="0" fromWordArt="0" anchor="ctr" anchorCtr="0" forceAA="0" compatLnSpc="1">
+            <a:prstTxWarp prst="textNoShape">
+              <a:avLst/>
+            </a:prstTxWarp>
+            <a:noAutofit/>
+          </a:bodyPr>
+          <a:lstStyle/>
+          <a:p>
+            <a:pPr algn="ctr"/>
+            <a:endParaRPr lang="es-PE"/>
+          </a:p>
+        </p:txBody>
+      </p:sp>
+      <p:pic>
+        <p:nvPicPr>
+          <p:cNvPr id="5" name="Imagen 4"/>
+          <p:cNvPicPr>
+            <a:picLocks noChangeAspect="1"/>
+          </p:cNvPicPr>
+          <p:nvPr/>
+        </p:nvPicPr>
+        <p:blipFill>
+          <a:blip r:embed="rId4"/>
+          <a:stretch>
+            <a:fillRect/>
+          </a:stretch>
+        </p:blipFill>
+        <p:spPr>
+          <a:xfrm>
+            <a:off x="8490692" y="414281"/>
+            <a:ext cx="2295525" cy="1514475"/>
+          </a:xfrm>
+          <a:prstGeom prst="rect">
+            <a:avLst/>
+          </a:prstGeom>
+        </p:spPr>
+      </p:pic>
+      <p:sp>
+        <p:nvSpPr>
+          <p:cNvPr id="6" name="Rectángulo 5"/>
+          <p:cNvSpPr/>
+          <p:nvPr/>
+        </p:nvSpPr>
+        <p:spPr>
+          <a:xfrm>
+            <a:off x="900752" y="298541"/>
+            <a:ext cx="5321291" cy="255153"/>
+          </a:xfrm>
+          <a:prstGeom prst="rect">
+            <a:avLst/>
+          </a:prstGeom>
+          <a:solidFill>
+            <a:schemeClr val="bg1"/>
+          </a:solidFill>
+          <a:ln>
+            <a:solidFill>
+              <a:schemeClr val="bg1"/>
+            </a:solidFill>
+          </a:ln>
+        </p:spPr>
+        <p:style>
+          <a:lnRef idx="2">
+            <a:schemeClr val="accent1">
+              <a:shade val="50000"/>
+            </a:schemeClr>
+          </a:lnRef>
+          <a:fillRef idx="1">
+            <a:schemeClr val="accent1"/>
+          </a:fillRef>
+          <a:effectRef idx="0">
+            <a:schemeClr val="accent1"/>
+          </a:effectRef>
+          <a:fontRef idx="minor">
+            <a:schemeClr val="lt1"/>
+          </a:fontRef>
+        </p:style>
+        <p:txBody>
+          <a:bodyPr rtlCol="0" anchor="ctr"/>
+          <a:lstStyle/>
+          <a:p>
+            <a:pPr algn="ctr"/>
+            <a:endParaRPr lang="es-PE"/>
+          </a:p>
+        </p:txBody>
+      </p:sp>
+      <p:pic>
+        <p:nvPicPr>
+          <p:cNvPr id="7" name="Imagen 6"/>
+          <p:cNvPicPr>
+            <a:picLocks noChangeAspect="1"/>
+          </p:cNvPicPr>
+          <p:nvPr/>
+        </p:nvPicPr>
+        <p:blipFill>
+          <a:blip r:embed="rId5"/>
+          <a:stretch>
+            <a:fillRect/>
+          </a:stretch>
+        </p:blipFill>
+        <p:spPr>
+          <a:xfrm>
+            <a:off x="8274611" y="2949082"/>
+            <a:ext cx="2634436" cy="2400841"/>
           </a:xfrm>
           <a:prstGeom prst="rect">
             <a:avLst/>
@@ -3247,8 +3938,107 @@
         </p:blipFill>
         <p:spPr>
           <a:xfrm>
-            <a:off x="2208847" y="622663"/>
+            <a:off x="3737397" y="745493"/>
             <a:ext cx="7514463" cy="4968240"/>
+          </a:xfrm>
+          <a:prstGeom prst="rect">
+            <a:avLst/>
+          </a:prstGeom>
+        </p:spPr>
+      </p:pic>
+      <p:pic>
+        <p:nvPicPr>
+          <p:cNvPr id="3" name="Imagen 2"/>
+          <p:cNvPicPr>
+            <a:picLocks noChangeAspect="1"/>
+          </p:cNvPicPr>
+          <p:nvPr/>
+        </p:nvPicPr>
+        <p:blipFill>
+          <a:blip r:embed="rId3"/>
+          <a:stretch>
+            <a:fillRect/>
+          </a:stretch>
+        </p:blipFill>
+        <p:spPr>
+          <a:xfrm>
+            <a:off x="468715" y="1160059"/>
+            <a:ext cx="3071595" cy="1513620"/>
+          </a:xfrm>
+          <a:prstGeom prst="rect">
+            <a:avLst/>
+          </a:prstGeom>
+        </p:spPr>
+      </p:pic>
+      <p:sp>
+        <p:nvSpPr>
+          <p:cNvPr id="4" name="Rectángulo 3"/>
+          <p:cNvSpPr/>
+          <p:nvPr/>
+        </p:nvSpPr>
+        <p:spPr>
+          <a:xfrm>
+            <a:off x="4012442" y="3411940"/>
+            <a:ext cx="7096836" cy="1733266"/>
+          </a:xfrm>
+          <a:prstGeom prst="rect">
+            <a:avLst/>
+          </a:prstGeom>
+          <a:noFill/>
+          <a:ln>
+            <a:solidFill>
+              <a:srgbClr val="FF0000"/>
+            </a:solidFill>
+          </a:ln>
+        </p:spPr>
+        <p:style>
+          <a:lnRef idx="2">
+            <a:schemeClr val="accent1">
+              <a:shade val="50000"/>
+            </a:schemeClr>
+          </a:lnRef>
+          <a:fillRef idx="1">
+            <a:schemeClr val="accent1"/>
+          </a:fillRef>
+          <a:effectRef idx="0">
+            <a:schemeClr val="accent1"/>
+          </a:effectRef>
+          <a:fontRef idx="minor">
+            <a:schemeClr val="lt1"/>
+          </a:fontRef>
+        </p:style>
+        <p:txBody>
+          <a:bodyPr rot="0" spcFirstLastPara="0" vertOverflow="overflow" horzOverflow="overflow" vert="horz" wrap="square" lIns="91440" tIns="45720" rIns="91440" bIns="45720" numCol="1" spcCol="0" rtlCol="0" fromWordArt="0" anchor="ctr" anchorCtr="0" forceAA="0" compatLnSpc="1">
+            <a:prstTxWarp prst="textNoShape">
+              <a:avLst/>
+            </a:prstTxWarp>
+            <a:noAutofit/>
+          </a:bodyPr>
+          <a:lstStyle/>
+          <a:p>
+            <a:pPr algn="ctr"/>
+            <a:endParaRPr lang="es-PE"/>
+          </a:p>
+        </p:txBody>
+      </p:sp>
+      <p:pic>
+        <p:nvPicPr>
+          <p:cNvPr id="5" name="Imagen 4"/>
+          <p:cNvPicPr>
+            <a:picLocks noChangeAspect="1"/>
+          </p:cNvPicPr>
+          <p:nvPr/>
+        </p:nvPicPr>
+        <p:blipFill>
+          <a:blip r:embed="rId4"/>
+          <a:stretch>
+            <a:fillRect/>
+          </a:stretch>
+        </p:blipFill>
+        <p:spPr>
+          <a:xfrm>
+            <a:off x="398503" y="3411940"/>
+            <a:ext cx="3141807" cy="2475363"/>
           </a:xfrm>
           <a:prstGeom prst="rect">
             <a:avLst/>
@@ -3309,6 +4099,156 @@
           </a:prstGeom>
         </p:spPr>
       </p:pic>
+      <p:sp>
+        <p:nvSpPr>
+          <p:cNvPr id="3" name="Rectángulo 2"/>
+          <p:cNvSpPr/>
+          <p:nvPr/>
+        </p:nvSpPr>
+        <p:spPr>
+          <a:xfrm>
+            <a:off x="1552301" y="1160060"/>
+            <a:ext cx="8833645" cy="1310185"/>
+          </a:xfrm>
+          <a:prstGeom prst="rect">
+            <a:avLst/>
+          </a:prstGeom>
+          <a:noFill/>
+          <a:ln>
+            <a:solidFill>
+              <a:srgbClr val="FF0000"/>
+            </a:solidFill>
+          </a:ln>
+        </p:spPr>
+        <p:style>
+          <a:lnRef idx="2">
+            <a:schemeClr val="accent1">
+              <a:shade val="50000"/>
+            </a:schemeClr>
+          </a:lnRef>
+          <a:fillRef idx="1">
+            <a:schemeClr val="accent1"/>
+          </a:fillRef>
+          <a:effectRef idx="0">
+            <a:schemeClr val="accent1"/>
+          </a:effectRef>
+          <a:fontRef idx="minor">
+            <a:schemeClr val="lt1"/>
+          </a:fontRef>
+        </p:style>
+        <p:txBody>
+          <a:bodyPr rot="0" spcFirstLastPara="0" vertOverflow="overflow" horzOverflow="overflow" vert="horz" wrap="square" lIns="91440" tIns="45720" rIns="91440" bIns="45720" numCol="1" spcCol="0" rtlCol="0" fromWordArt="0" anchor="ctr" anchorCtr="0" forceAA="0" compatLnSpc="1">
+            <a:prstTxWarp prst="textNoShape">
+              <a:avLst/>
+            </a:prstTxWarp>
+            <a:noAutofit/>
+          </a:bodyPr>
+          <a:lstStyle/>
+          <a:p>
+            <a:pPr algn="ctr"/>
+            <a:endParaRPr lang="es-PE"/>
+          </a:p>
+        </p:txBody>
+      </p:sp>
+      <p:sp>
+        <p:nvSpPr>
+          <p:cNvPr id="4" name="Rectángulo 3"/>
+          <p:cNvSpPr/>
+          <p:nvPr/>
+        </p:nvSpPr>
+        <p:spPr>
+          <a:xfrm>
+            <a:off x="1705970" y="3261815"/>
+            <a:ext cx="8679976" cy="655092"/>
+          </a:xfrm>
+          <a:prstGeom prst="rect">
+            <a:avLst/>
+          </a:prstGeom>
+          <a:noFill/>
+          <a:ln>
+            <a:solidFill>
+              <a:srgbClr val="FF0000"/>
+            </a:solidFill>
+          </a:ln>
+        </p:spPr>
+        <p:style>
+          <a:lnRef idx="2">
+            <a:schemeClr val="accent1">
+              <a:shade val="50000"/>
+            </a:schemeClr>
+          </a:lnRef>
+          <a:fillRef idx="1">
+            <a:schemeClr val="accent1"/>
+          </a:fillRef>
+          <a:effectRef idx="0">
+            <a:schemeClr val="accent1"/>
+          </a:effectRef>
+          <a:fontRef idx="minor">
+            <a:schemeClr val="lt1"/>
+          </a:fontRef>
+        </p:style>
+        <p:txBody>
+          <a:bodyPr rot="0" spcFirstLastPara="0" vertOverflow="overflow" horzOverflow="overflow" vert="horz" wrap="square" lIns="91440" tIns="45720" rIns="91440" bIns="45720" numCol="1" spcCol="0" rtlCol="0" fromWordArt="0" anchor="ctr" anchorCtr="0" forceAA="0" compatLnSpc="1">
+            <a:prstTxWarp prst="textNoShape">
+              <a:avLst/>
+            </a:prstTxWarp>
+            <a:noAutofit/>
+          </a:bodyPr>
+          <a:lstStyle/>
+          <a:p>
+            <a:pPr algn="ctr"/>
+            <a:endParaRPr lang="es-PE"/>
+          </a:p>
+        </p:txBody>
+      </p:sp>
+      <p:sp>
+        <p:nvSpPr>
+          <p:cNvPr id="5" name="Rectángulo 4"/>
+          <p:cNvSpPr/>
+          <p:nvPr/>
+        </p:nvSpPr>
+        <p:spPr>
+          <a:xfrm>
+            <a:off x="3029803" y="5334565"/>
+            <a:ext cx="7356143" cy="400029"/>
+          </a:xfrm>
+          <a:prstGeom prst="rect">
+            <a:avLst/>
+          </a:prstGeom>
+          <a:solidFill>
+            <a:schemeClr val="bg1"/>
+          </a:solidFill>
+          <a:ln>
+            <a:solidFill>
+              <a:schemeClr val="bg1"/>
+            </a:solidFill>
+          </a:ln>
+        </p:spPr>
+        <p:style>
+          <a:lnRef idx="2">
+            <a:schemeClr val="accent1">
+              <a:shade val="50000"/>
+            </a:schemeClr>
+          </a:lnRef>
+          <a:fillRef idx="1">
+            <a:schemeClr val="accent1"/>
+          </a:fillRef>
+          <a:effectRef idx="0">
+            <a:schemeClr val="accent1"/>
+          </a:effectRef>
+          <a:fontRef idx="minor">
+            <a:schemeClr val="lt1"/>
+          </a:fontRef>
+        </p:style>
+        <p:txBody>
+          <a:bodyPr rtlCol="0" anchor="ctr"/>
+          <a:lstStyle/>
+          <a:p>
+            <a:pPr algn="ctr"/>
+            <a:endParaRPr lang="es-PE"/>
+          </a:p>
+        </p:txBody>
+      </p:sp>
     </p:spTree>
     <p:extLst>
       <p:ext uri="{BB962C8B-B14F-4D97-AF65-F5344CB8AC3E}">
@@ -3363,6 +4303,108 @@
           </a:prstGeom>
         </p:spPr>
       </p:pic>
+      <p:sp>
+        <p:nvSpPr>
+          <p:cNvPr id="3" name="Rectángulo 2"/>
+          <p:cNvSpPr/>
+          <p:nvPr/>
+        </p:nvSpPr>
+        <p:spPr>
+          <a:xfrm>
+            <a:off x="2204357" y="1351128"/>
+            <a:ext cx="7953882" cy="1228299"/>
+          </a:xfrm>
+          <a:prstGeom prst="rect">
+            <a:avLst/>
+          </a:prstGeom>
+          <a:noFill/>
+          <a:ln>
+            <a:solidFill>
+              <a:srgbClr val="FF0000"/>
+            </a:solidFill>
+          </a:ln>
+        </p:spPr>
+        <p:style>
+          <a:lnRef idx="2">
+            <a:schemeClr val="accent1">
+              <a:shade val="50000"/>
+            </a:schemeClr>
+          </a:lnRef>
+          <a:fillRef idx="1">
+            <a:schemeClr val="accent1"/>
+          </a:fillRef>
+          <a:effectRef idx="0">
+            <a:schemeClr val="accent1"/>
+          </a:effectRef>
+          <a:fontRef idx="minor">
+            <a:schemeClr val="lt1"/>
+          </a:fontRef>
+        </p:style>
+        <p:txBody>
+          <a:bodyPr rot="0" spcFirstLastPara="0" vertOverflow="overflow" horzOverflow="overflow" vert="horz" wrap="square" lIns="91440" tIns="45720" rIns="91440" bIns="45720" numCol="1" spcCol="0" rtlCol="0" fromWordArt="0" anchor="ctr" anchorCtr="0" forceAA="0" compatLnSpc="1">
+            <a:prstTxWarp prst="textNoShape">
+              <a:avLst/>
+            </a:prstTxWarp>
+            <a:noAutofit/>
+          </a:bodyPr>
+          <a:lstStyle/>
+          <a:p>
+            <a:pPr algn="ctr"/>
+            <a:endParaRPr lang="es-PE"/>
+          </a:p>
+        </p:txBody>
+      </p:sp>
+      <p:sp>
+        <p:nvSpPr>
+          <p:cNvPr id="4" name="Rectángulo 3"/>
+          <p:cNvSpPr/>
+          <p:nvPr/>
+        </p:nvSpPr>
+        <p:spPr>
+          <a:xfrm>
+            <a:off x="2320119" y="3534771"/>
+            <a:ext cx="7838120" cy="1990818"/>
+          </a:xfrm>
+          <a:prstGeom prst="rect">
+            <a:avLst/>
+          </a:prstGeom>
+          <a:noFill/>
+          <a:ln>
+            <a:solidFill>
+              <a:srgbClr val="FF0000"/>
+            </a:solidFill>
+          </a:ln>
+        </p:spPr>
+        <p:style>
+          <a:lnRef idx="2">
+            <a:schemeClr val="accent1">
+              <a:shade val="50000"/>
+            </a:schemeClr>
+          </a:lnRef>
+          <a:fillRef idx="1">
+            <a:schemeClr val="accent1"/>
+          </a:fillRef>
+          <a:effectRef idx="0">
+            <a:schemeClr val="accent1"/>
+          </a:effectRef>
+          <a:fontRef idx="minor">
+            <a:schemeClr val="lt1"/>
+          </a:fontRef>
+        </p:style>
+        <p:txBody>
+          <a:bodyPr rot="0" spcFirstLastPara="0" vertOverflow="overflow" horzOverflow="overflow" vert="horz" wrap="square" lIns="91440" tIns="45720" rIns="91440" bIns="45720" numCol="1" spcCol="0" rtlCol="0" fromWordArt="0" anchor="ctr" anchorCtr="0" forceAA="0" compatLnSpc="1">
+            <a:prstTxWarp prst="textNoShape">
+              <a:avLst/>
+            </a:prstTxWarp>
+            <a:noAutofit/>
+          </a:bodyPr>
+          <a:lstStyle/>
+          <a:p>
+            <a:pPr algn="ctr"/>
+            <a:endParaRPr lang="es-PE"/>
+          </a:p>
+        </p:txBody>
+      </p:sp>
     </p:spTree>
     <p:extLst>
       <p:ext uri="{BB962C8B-B14F-4D97-AF65-F5344CB8AC3E}">
@@ -3417,6 +4459,54 @@
           </a:prstGeom>
         </p:spPr>
       </p:pic>
+      <p:sp>
+        <p:nvSpPr>
+          <p:cNvPr id="4" name="Rectángulo 3"/>
+          <p:cNvSpPr/>
+          <p:nvPr/>
+        </p:nvSpPr>
+        <p:spPr>
+          <a:xfrm>
+            <a:off x="7506268" y="4820194"/>
+            <a:ext cx="3453514" cy="457200"/>
+          </a:xfrm>
+          <a:prstGeom prst="rect">
+            <a:avLst/>
+          </a:prstGeom>
+          <a:solidFill>
+            <a:schemeClr val="bg1"/>
+          </a:solidFill>
+          <a:ln>
+            <a:solidFill>
+              <a:schemeClr val="bg1"/>
+            </a:solidFill>
+          </a:ln>
+        </p:spPr>
+        <p:style>
+          <a:lnRef idx="2">
+            <a:schemeClr val="accent1">
+              <a:shade val="50000"/>
+            </a:schemeClr>
+          </a:lnRef>
+          <a:fillRef idx="1">
+            <a:schemeClr val="accent1"/>
+          </a:fillRef>
+          <a:effectRef idx="0">
+            <a:schemeClr val="accent1"/>
+          </a:effectRef>
+          <a:fontRef idx="minor">
+            <a:schemeClr val="lt1"/>
+          </a:fontRef>
+        </p:style>
+        <p:txBody>
+          <a:bodyPr rtlCol="0" anchor="ctr"/>
+          <a:lstStyle/>
+          <a:p>
+            <a:pPr algn="ctr"/>
+            <a:endParaRPr lang="es-PE"/>
+          </a:p>
+        </p:txBody>
+      </p:sp>
     </p:spTree>
     <p:extLst>
       <p:ext uri="{BB962C8B-B14F-4D97-AF65-F5344CB8AC3E}">
@@ -3463,7 +4553,7 @@
         </p:blipFill>
         <p:spPr>
           <a:xfrm>
-            <a:off x="1576251" y="590958"/>
+            <a:off x="1562603" y="1696426"/>
             <a:ext cx="9175949" cy="1133339"/>
           </a:xfrm>
           <a:prstGeom prst="rect">
@@ -3487,7 +4577,7 @@
         </p:blipFill>
         <p:spPr>
           <a:xfrm>
-            <a:off x="1576251" y="2464525"/>
+            <a:off x="1562603" y="3569993"/>
             <a:ext cx="9199286" cy="1519646"/>
           </a:xfrm>
           <a:prstGeom prst="rect">
@@ -3495,6 +4585,201 @@
           </a:prstGeom>
         </p:spPr>
       </p:pic>
+      <p:sp>
+        <p:nvSpPr>
+          <p:cNvPr id="4" name="Rectángulo 3"/>
+          <p:cNvSpPr/>
+          <p:nvPr/>
+        </p:nvSpPr>
+        <p:spPr>
+          <a:xfrm>
+            <a:off x="1562604" y="1696425"/>
+            <a:ext cx="4415116" cy="323443"/>
+          </a:xfrm>
+          <a:prstGeom prst="rect">
+            <a:avLst/>
+          </a:prstGeom>
+          <a:solidFill>
+            <a:schemeClr val="bg1"/>
+          </a:solidFill>
+          <a:ln>
+            <a:solidFill>
+              <a:schemeClr val="bg1"/>
+            </a:solidFill>
+          </a:ln>
+        </p:spPr>
+        <p:style>
+          <a:lnRef idx="2">
+            <a:schemeClr val="accent1">
+              <a:shade val="50000"/>
+            </a:schemeClr>
+          </a:lnRef>
+          <a:fillRef idx="1">
+            <a:schemeClr val="accent1"/>
+          </a:fillRef>
+          <a:effectRef idx="0">
+            <a:schemeClr val="accent1"/>
+          </a:effectRef>
+          <a:fontRef idx="minor">
+            <a:schemeClr val="lt1"/>
+          </a:fontRef>
+        </p:style>
+        <p:txBody>
+          <a:bodyPr rtlCol="0" anchor="ctr"/>
+          <a:lstStyle/>
+          <a:p>
+            <a:pPr algn="ctr"/>
+            <a:endParaRPr lang="es-PE"/>
+          </a:p>
+        </p:txBody>
+      </p:sp>
+      <p:sp>
+        <p:nvSpPr>
+          <p:cNvPr id="5" name="Rectángulo 4"/>
+          <p:cNvSpPr/>
+          <p:nvPr/>
+        </p:nvSpPr>
+        <p:spPr>
+          <a:xfrm>
+            <a:off x="7533564" y="2388357"/>
+            <a:ext cx="3228325" cy="441408"/>
+          </a:xfrm>
+          <a:prstGeom prst="rect">
+            <a:avLst/>
+          </a:prstGeom>
+          <a:solidFill>
+            <a:schemeClr val="bg1"/>
+          </a:solidFill>
+          <a:ln>
+            <a:solidFill>
+              <a:schemeClr val="bg1"/>
+            </a:solidFill>
+          </a:ln>
+        </p:spPr>
+        <p:style>
+          <a:lnRef idx="2">
+            <a:schemeClr val="accent1">
+              <a:shade val="50000"/>
+            </a:schemeClr>
+          </a:lnRef>
+          <a:fillRef idx="1">
+            <a:schemeClr val="accent1"/>
+          </a:fillRef>
+          <a:effectRef idx="0">
+            <a:schemeClr val="accent1"/>
+          </a:effectRef>
+          <a:fontRef idx="minor">
+            <a:schemeClr val="lt1"/>
+          </a:fontRef>
+        </p:style>
+        <p:txBody>
+          <a:bodyPr rtlCol="0" anchor="ctr"/>
+          <a:lstStyle/>
+          <a:p>
+            <a:pPr algn="ctr"/>
+            <a:endParaRPr lang="es-PE"/>
+          </a:p>
+        </p:txBody>
+      </p:sp>
+      <p:sp>
+        <p:nvSpPr>
+          <p:cNvPr id="6" name="Rectángulo 5"/>
+          <p:cNvSpPr/>
+          <p:nvPr/>
+        </p:nvSpPr>
+        <p:spPr>
+          <a:xfrm>
+            <a:off x="1562603" y="3569993"/>
+            <a:ext cx="716573" cy="441408"/>
+          </a:xfrm>
+          <a:prstGeom prst="rect">
+            <a:avLst/>
+          </a:prstGeom>
+          <a:solidFill>
+            <a:schemeClr val="bg1"/>
+          </a:solidFill>
+          <a:ln>
+            <a:solidFill>
+              <a:schemeClr val="bg1"/>
+            </a:solidFill>
+          </a:ln>
+        </p:spPr>
+        <p:style>
+          <a:lnRef idx="2">
+            <a:schemeClr val="accent1">
+              <a:shade val="50000"/>
+            </a:schemeClr>
+          </a:lnRef>
+          <a:fillRef idx="1">
+            <a:schemeClr val="accent1"/>
+          </a:fillRef>
+          <a:effectRef idx="0">
+            <a:schemeClr val="accent1"/>
+          </a:effectRef>
+          <a:fontRef idx="minor">
+            <a:schemeClr val="lt1"/>
+          </a:fontRef>
+        </p:style>
+        <p:txBody>
+          <a:bodyPr rtlCol="0" anchor="ctr"/>
+          <a:lstStyle/>
+          <a:p>
+            <a:pPr algn="ctr"/>
+            <a:endParaRPr lang="es-PE"/>
+          </a:p>
+        </p:txBody>
+      </p:sp>
+      <p:sp>
+        <p:nvSpPr>
+          <p:cNvPr id="7" name="Rectángulo 6"/>
+          <p:cNvSpPr/>
+          <p:nvPr/>
+        </p:nvSpPr>
+        <p:spPr>
+          <a:xfrm>
+            <a:off x="1562603" y="3903259"/>
+            <a:ext cx="9175949" cy="1186380"/>
+          </a:xfrm>
+          <a:prstGeom prst="rect">
+            <a:avLst/>
+          </a:prstGeom>
+          <a:noFill/>
+          <a:ln>
+            <a:solidFill>
+              <a:srgbClr val="FF0000"/>
+            </a:solidFill>
+          </a:ln>
+        </p:spPr>
+        <p:style>
+          <a:lnRef idx="2">
+            <a:schemeClr val="accent1">
+              <a:shade val="50000"/>
+            </a:schemeClr>
+          </a:lnRef>
+          <a:fillRef idx="1">
+            <a:schemeClr val="accent1"/>
+          </a:fillRef>
+          <a:effectRef idx="0">
+            <a:schemeClr val="accent1"/>
+          </a:effectRef>
+          <a:fontRef idx="minor">
+            <a:schemeClr val="lt1"/>
+          </a:fontRef>
+        </p:style>
+        <p:txBody>
+          <a:bodyPr rot="0" spcFirstLastPara="0" vertOverflow="overflow" horzOverflow="overflow" vert="horz" wrap="square" lIns="91440" tIns="45720" rIns="91440" bIns="45720" numCol="1" spcCol="0" rtlCol="0" fromWordArt="0" anchor="ctr" anchorCtr="0" forceAA="0" compatLnSpc="1">
+            <a:prstTxWarp prst="textNoShape">
+              <a:avLst/>
+            </a:prstTxWarp>
+            <a:noAutofit/>
+          </a:bodyPr>
+          <a:lstStyle/>
+          <a:p>
+            <a:pPr algn="ctr"/>
+            <a:endParaRPr lang="es-PE"/>
+          </a:p>
+        </p:txBody>
+      </p:sp>
     </p:spTree>
     <p:extLst>
       <p:ext uri="{BB962C8B-B14F-4D97-AF65-F5344CB8AC3E}">
@@ -3603,6 +4888,105 @@
           </a:prstGeom>
         </p:spPr>
       </p:pic>
+      <p:sp>
+        <p:nvSpPr>
+          <p:cNvPr id="3" name="Rectángulo 2"/>
+          <p:cNvSpPr/>
+          <p:nvPr/>
+        </p:nvSpPr>
+        <p:spPr>
+          <a:xfrm>
+            <a:off x="2408765" y="413537"/>
+            <a:ext cx="675629" cy="214260"/>
+          </a:xfrm>
+          <a:prstGeom prst="rect">
+            <a:avLst/>
+          </a:prstGeom>
+          <a:solidFill>
+            <a:schemeClr val="bg1"/>
+          </a:solidFill>
+          <a:ln>
+            <a:solidFill>
+              <a:schemeClr val="bg1"/>
+            </a:solidFill>
+          </a:ln>
+        </p:spPr>
+        <p:style>
+          <a:lnRef idx="2">
+            <a:schemeClr val="accent1">
+              <a:shade val="50000"/>
+            </a:schemeClr>
+          </a:lnRef>
+          <a:fillRef idx="1">
+            <a:schemeClr val="accent1"/>
+          </a:fillRef>
+          <a:effectRef idx="0">
+            <a:schemeClr val="accent1"/>
+          </a:effectRef>
+          <a:fontRef idx="minor">
+            <a:schemeClr val="lt1"/>
+          </a:fontRef>
+        </p:style>
+        <p:txBody>
+          <a:bodyPr rtlCol="0" anchor="ctr"/>
+          <a:lstStyle/>
+          <a:p>
+            <a:pPr algn="ctr"/>
+            <a:endParaRPr lang="es-PE"/>
+          </a:p>
+        </p:txBody>
+      </p:sp>
+      <p:sp>
+        <p:nvSpPr>
+          <p:cNvPr id="4" name="Rectángulo 3"/>
+          <p:cNvSpPr/>
+          <p:nvPr/>
+        </p:nvSpPr>
+        <p:spPr>
+          <a:xfrm>
+            <a:off x="2408765" y="4353636"/>
+            <a:ext cx="7414503" cy="2108764"/>
+          </a:xfrm>
+          <a:prstGeom prst="rect">
+            <a:avLst/>
+          </a:prstGeom>
+          <a:noFill/>
+          <a:ln>
+            <a:solidFill>
+              <a:srgbClr val="FF0000"/>
+            </a:solidFill>
+          </a:ln>
+        </p:spPr>
+        <p:style>
+          <a:lnRef idx="2">
+            <a:schemeClr val="accent1">
+              <a:shade val="50000"/>
+            </a:schemeClr>
+          </a:lnRef>
+          <a:fillRef idx="1">
+            <a:schemeClr val="accent1"/>
+          </a:fillRef>
+          <a:effectRef idx="0">
+            <a:schemeClr val="accent1"/>
+          </a:effectRef>
+          <a:fontRef idx="minor">
+            <a:schemeClr val="lt1"/>
+          </a:fontRef>
+        </p:style>
+        <p:txBody>
+          <a:bodyPr rot="0" spcFirstLastPara="0" vertOverflow="overflow" horzOverflow="overflow" vert="horz" wrap="square" lIns="91440" tIns="45720" rIns="91440" bIns="45720" numCol="1" spcCol="0" rtlCol="0" fromWordArt="0" anchor="ctr" anchorCtr="0" forceAA="0" compatLnSpc="1">
+            <a:prstTxWarp prst="textNoShape">
+              <a:avLst/>
+            </a:prstTxWarp>
+            <a:noAutofit/>
+          </a:bodyPr>
+          <a:lstStyle/>
+          <a:p>
+            <a:pPr algn="ctr"/>
+            <a:endParaRPr lang="es-PE"/>
+          </a:p>
+        </p:txBody>
+      </p:sp>
     </p:spTree>
     <p:extLst>
       <p:ext uri="{BB962C8B-B14F-4D97-AF65-F5344CB8AC3E}">
@@ -3649,7 +5033,7 @@
         </p:blipFill>
         <p:spPr>
           <a:xfrm>
-            <a:off x="1207632" y="846091"/>
+            <a:off x="1989297" y="964078"/>
             <a:ext cx="9757545" cy="4601119"/>
           </a:xfrm>
           <a:prstGeom prst="rect">
@@ -3665,7 +5049,7 @@
         </p:nvSpPr>
         <p:spPr>
           <a:xfrm>
-            <a:off x="4258491" y="2769326"/>
+            <a:off x="5040156" y="2887313"/>
             <a:ext cx="4663440" cy="326571"/>
           </a:xfrm>
           <a:prstGeom prst="rect">
@@ -3675,6 +5059,78 @@
           <a:ln>
             <a:solidFill>
               <a:srgbClr val="FF0000"/>
+            </a:solidFill>
+          </a:ln>
+        </p:spPr>
+        <p:style>
+          <a:lnRef idx="2">
+            <a:schemeClr val="accent1">
+              <a:shade val="50000"/>
+            </a:schemeClr>
+          </a:lnRef>
+          <a:fillRef idx="1">
+            <a:schemeClr val="accent1"/>
+          </a:fillRef>
+          <a:effectRef idx="0">
+            <a:schemeClr val="accent1"/>
+          </a:effectRef>
+          <a:fontRef idx="minor">
+            <a:schemeClr val="lt1"/>
+          </a:fontRef>
+        </p:style>
+        <p:txBody>
+          <a:bodyPr rtlCol="0" anchor="ctr"/>
+          <a:lstStyle/>
+          <a:p>
+            <a:pPr algn="ctr"/>
+            <a:endParaRPr lang="es-PE"/>
+          </a:p>
+        </p:txBody>
+      </p:sp>
+      <p:pic>
+        <p:nvPicPr>
+          <p:cNvPr id="4" name="Imagen 3"/>
+          <p:cNvPicPr>
+            <a:picLocks noChangeAspect="1"/>
+          </p:cNvPicPr>
+          <p:nvPr/>
+        </p:nvPicPr>
+        <p:blipFill>
+          <a:blip r:embed="rId3"/>
+          <a:stretch>
+            <a:fillRect/>
+          </a:stretch>
+        </p:blipFill>
+        <p:spPr>
+          <a:xfrm>
+            <a:off x="277984" y="1955910"/>
+            <a:ext cx="1885318" cy="2515947"/>
+          </a:xfrm>
+          <a:prstGeom prst="rect">
+            <a:avLst/>
+          </a:prstGeom>
+        </p:spPr>
+      </p:pic>
+      <p:sp>
+        <p:nvSpPr>
+          <p:cNvPr id="5" name="Rectángulo 4"/>
+          <p:cNvSpPr/>
+          <p:nvPr/>
+        </p:nvSpPr>
+        <p:spPr>
+          <a:xfrm>
+            <a:off x="7049729" y="5102942"/>
+            <a:ext cx="4365523" cy="462255"/>
+          </a:xfrm>
+          <a:prstGeom prst="rect">
+            <a:avLst/>
+          </a:prstGeom>
+          <a:solidFill>
+            <a:schemeClr val="bg1"/>
+          </a:solidFill>
+          <a:ln>
+            <a:solidFill>
+              <a:schemeClr val="bg1"/>
             </a:solidFill>
           </a:ln>
         </p:spPr>
@@ -3757,6 +5213,108 @@
           </a:prstGeom>
         </p:spPr>
       </p:pic>
+      <p:sp>
+        <p:nvSpPr>
+          <p:cNvPr id="3" name="Rectángulo 2"/>
+          <p:cNvSpPr/>
+          <p:nvPr/>
+        </p:nvSpPr>
+        <p:spPr>
+          <a:xfrm>
+            <a:off x="2019869" y="1310185"/>
+            <a:ext cx="8338978" cy="2715905"/>
+          </a:xfrm>
+          <a:prstGeom prst="rect">
+            <a:avLst/>
+          </a:prstGeom>
+          <a:noFill/>
+          <a:ln>
+            <a:solidFill>
+              <a:srgbClr val="FF0000"/>
+            </a:solidFill>
+          </a:ln>
+        </p:spPr>
+        <p:style>
+          <a:lnRef idx="2">
+            <a:schemeClr val="accent1">
+              <a:shade val="50000"/>
+            </a:schemeClr>
+          </a:lnRef>
+          <a:fillRef idx="1">
+            <a:schemeClr val="accent1"/>
+          </a:fillRef>
+          <a:effectRef idx="0">
+            <a:schemeClr val="accent1"/>
+          </a:effectRef>
+          <a:fontRef idx="minor">
+            <a:schemeClr val="lt1"/>
+          </a:fontRef>
+        </p:style>
+        <p:txBody>
+          <a:bodyPr rot="0" spcFirstLastPara="0" vertOverflow="overflow" horzOverflow="overflow" vert="horz" wrap="square" lIns="91440" tIns="45720" rIns="91440" bIns="45720" numCol="1" spcCol="0" rtlCol="0" fromWordArt="0" anchor="ctr" anchorCtr="0" forceAA="0" compatLnSpc="1">
+            <a:prstTxWarp prst="textNoShape">
+              <a:avLst/>
+            </a:prstTxWarp>
+            <a:noAutofit/>
+          </a:bodyPr>
+          <a:lstStyle/>
+          <a:p>
+            <a:pPr algn="ctr"/>
+            <a:endParaRPr lang="es-PE"/>
+          </a:p>
+        </p:txBody>
+      </p:sp>
+      <p:sp>
+        <p:nvSpPr>
+          <p:cNvPr id="4" name="Rectángulo 3"/>
+          <p:cNvSpPr/>
+          <p:nvPr/>
+        </p:nvSpPr>
+        <p:spPr>
+          <a:xfrm>
+            <a:off x="1884863" y="5063319"/>
+            <a:ext cx="8637561" cy="1054018"/>
+          </a:xfrm>
+          <a:prstGeom prst="rect">
+            <a:avLst/>
+          </a:prstGeom>
+          <a:noFill/>
+          <a:ln>
+            <a:solidFill>
+              <a:srgbClr val="FF0000"/>
+            </a:solidFill>
+          </a:ln>
+        </p:spPr>
+        <p:style>
+          <a:lnRef idx="2">
+            <a:schemeClr val="accent1">
+              <a:shade val="50000"/>
+            </a:schemeClr>
+          </a:lnRef>
+          <a:fillRef idx="1">
+            <a:schemeClr val="accent1"/>
+          </a:fillRef>
+          <a:effectRef idx="0">
+            <a:schemeClr val="accent1"/>
+          </a:effectRef>
+          <a:fontRef idx="minor">
+            <a:schemeClr val="lt1"/>
+          </a:fontRef>
+        </p:style>
+        <p:txBody>
+          <a:bodyPr rot="0" spcFirstLastPara="0" vertOverflow="overflow" horzOverflow="overflow" vert="horz" wrap="square" lIns="91440" tIns="45720" rIns="91440" bIns="45720" numCol="1" spcCol="0" rtlCol="0" fromWordArt="0" anchor="ctr" anchorCtr="0" forceAA="0" compatLnSpc="1">
+            <a:prstTxWarp prst="textNoShape">
+              <a:avLst/>
+            </a:prstTxWarp>
+            <a:noAutofit/>
+          </a:bodyPr>
+          <a:lstStyle/>
+          <a:p>
+            <a:pPr algn="ctr"/>
+            <a:endParaRPr lang="es-PE"/>
+          </a:p>
+        </p:txBody>
+      </p:sp>
     </p:spTree>
     <p:extLst>
       <p:ext uri="{BB962C8B-B14F-4D97-AF65-F5344CB8AC3E}">
@@ -3811,6 +5369,153 @@
           </a:prstGeom>
         </p:spPr>
       </p:pic>
+      <p:sp>
+        <p:nvSpPr>
+          <p:cNvPr id="3" name="Rectángulo 2"/>
+          <p:cNvSpPr/>
+          <p:nvPr/>
+        </p:nvSpPr>
+        <p:spPr>
+          <a:xfrm>
+            <a:off x="889770" y="700139"/>
+            <a:ext cx="10408675" cy="596398"/>
+          </a:xfrm>
+          <a:prstGeom prst="rect">
+            <a:avLst/>
+          </a:prstGeom>
+          <a:solidFill>
+            <a:schemeClr val="bg1"/>
+          </a:solidFill>
+          <a:ln>
+            <a:solidFill>
+              <a:schemeClr val="bg1"/>
+            </a:solidFill>
+          </a:ln>
+        </p:spPr>
+        <p:style>
+          <a:lnRef idx="2">
+            <a:schemeClr val="accent1">
+              <a:shade val="50000"/>
+            </a:schemeClr>
+          </a:lnRef>
+          <a:fillRef idx="1">
+            <a:schemeClr val="accent1"/>
+          </a:fillRef>
+          <a:effectRef idx="0">
+            <a:schemeClr val="accent1"/>
+          </a:effectRef>
+          <a:fontRef idx="minor">
+            <a:schemeClr val="lt1"/>
+          </a:fontRef>
+        </p:style>
+        <p:txBody>
+          <a:bodyPr rtlCol="0" anchor="ctr"/>
+          <a:lstStyle/>
+          <a:p>
+            <a:pPr algn="ctr"/>
+            <a:endParaRPr lang="es-PE"/>
+          </a:p>
+        </p:txBody>
+      </p:sp>
+      <p:sp>
+        <p:nvSpPr>
+          <p:cNvPr id="4" name="Rectángulo 3"/>
+          <p:cNvSpPr/>
+          <p:nvPr/>
+        </p:nvSpPr>
+        <p:spPr>
+          <a:xfrm>
+            <a:off x="889769" y="1296536"/>
+            <a:ext cx="3859652" cy="480961"/>
+          </a:xfrm>
+          <a:prstGeom prst="rect">
+            <a:avLst/>
+          </a:prstGeom>
+          <a:solidFill>
+            <a:schemeClr val="bg1"/>
+          </a:solidFill>
+          <a:ln>
+            <a:solidFill>
+              <a:schemeClr val="bg1"/>
+            </a:solidFill>
+          </a:ln>
+        </p:spPr>
+        <p:style>
+          <a:lnRef idx="2">
+            <a:schemeClr val="accent1">
+              <a:shade val="50000"/>
+            </a:schemeClr>
+          </a:lnRef>
+          <a:fillRef idx="1">
+            <a:schemeClr val="accent1"/>
+          </a:fillRef>
+          <a:effectRef idx="0">
+            <a:schemeClr val="accent1"/>
+          </a:effectRef>
+          <a:fontRef idx="minor">
+            <a:schemeClr val="lt1"/>
+          </a:fontRef>
+        </p:style>
+        <p:txBody>
+          <a:bodyPr rtlCol="0" anchor="ctr"/>
+          <a:lstStyle/>
+          <a:p>
+            <a:pPr algn="ctr"/>
+            <a:endParaRPr lang="es-PE"/>
+          </a:p>
+        </p:txBody>
+      </p:sp>
+      <p:sp>
+        <p:nvSpPr>
+          <p:cNvPr id="5" name="Rectángulo 4"/>
+          <p:cNvSpPr/>
+          <p:nvPr/>
+        </p:nvSpPr>
+        <p:spPr>
+          <a:xfrm>
+            <a:off x="996287" y="2142699"/>
+            <a:ext cx="10302158" cy="1269241"/>
+          </a:xfrm>
+          <a:prstGeom prst="rect">
+            <a:avLst/>
+          </a:prstGeom>
+          <a:noFill/>
+          <a:ln>
+            <a:solidFill>
+              <a:srgbClr val="FF0000"/>
+            </a:solidFill>
+          </a:ln>
+        </p:spPr>
+        <p:style>
+          <a:lnRef idx="2">
+            <a:schemeClr val="accent1">
+              <a:shade val="50000"/>
+            </a:schemeClr>
+          </a:lnRef>
+          <a:fillRef idx="1">
+            <a:schemeClr val="accent1"/>
+          </a:fillRef>
+          <a:effectRef idx="0">
+            <a:schemeClr val="accent1"/>
+          </a:effectRef>
+          <a:fontRef idx="minor">
+            <a:schemeClr val="lt1"/>
+          </a:fontRef>
+        </p:style>
+        <p:txBody>
+          <a:bodyPr rot="0" spcFirstLastPara="0" vertOverflow="overflow" horzOverflow="overflow" vert="horz" wrap="square" lIns="91440" tIns="45720" rIns="91440" bIns="45720" numCol="1" spcCol="0" rtlCol="0" fromWordArt="0" anchor="ctr" anchorCtr="0" forceAA="0" compatLnSpc="1">
+            <a:prstTxWarp prst="textNoShape">
+              <a:avLst/>
+            </a:prstTxWarp>
+            <a:noAutofit/>
+          </a:bodyPr>
+          <a:lstStyle/>
+          <a:p>
+            <a:pPr algn="ctr"/>
+            <a:endParaRPr lang="es-PE"/>
+          </a:p>
+        </p:txBody>
+      </p:sp>
     </p:spTree>
     <p:extLst>
       <p:ext uri="{BB962C8B-B14F-4D97-AF65-F5344CB8AC3E}">
@@ -3889,6 +5594,150 @@
           </a:prstGeom>
         </p:spPr>
       </p:pic>
+      <p:sp>
+        <p:nvSpPr>
+          <p:cNvPr id="6" name="Rectángulo 5"/>
+          <p:cNvSpPr/>
+          <p:nvPr/>
+        </p:nvSpPr>
+        <p:spPr>
+          <a:xfrm>
+            <a:off x="1601152" y="592591"/>
+            <a:ext cx="7338132" cy="335457"/>
+          </a:xfrm>
+          <a:prstGeom prst="rect">
+            <a:avLst/>
+          </a:prstGeom>
+          <a:solidFill>
+            <a:schemeClr val="bg1"/>
+          </a:solidFill>
+          <a:ln>
+            <a:solidFill>
+              <a:schemeClr val="bg1"/>
+            </a:solidFill>
+          </a:ln>
+        </p:spPr>
+        <p:style>
+          <a:lnRef idx="2">
+            <a:schemeClr val="accent1">
+              <a:shade val="50000"/>
+            </a:schemeClr>
+          </a:lnRef>
+          <a:fillRef idx="1">
+            <a:schemeClr val="accent1"/>
+          </a:fillRef>
+          <a:effectRef idx="0">
+            <a:schemeClr val="accent1"/>
+          </a:effectRef>
+          <a:fontRef idx="minor">
+            <a:schemeClr val="lt1"/>
+          </a:fontRef>
+        </p:style>
+        <p:txBody>
+          <a:bodyPr rtlCol="0" anchor="ctr"/>
+          <a:lstStyle/>
+          <a:p>
+            <a:pPr algn="ctr"/>
+            <a:endParaRPr lang="es-PE"/>
+          </a:p>
+        </p:txBody>
+      </p:sp>
+      <p:sp>
+        <p:nvSpPr>
+          <p:cNvPr id="7" name="Rectángulo 6"/>
+          <p:cNvSpPr/>
+          <p:nvPr/>
+        </p:nvSpPr>
+        <p:spPr>
+          <a:xfrm>
+            <a:off x="8052178" y="1975500"/>
+            <a:ext cx="1910688" cy="362752"/>
+          </a:xfrm>
+          <a:prstGeom prst="rect">
+            <a:avLst/>
+          </a:prstGeom>
+          <a:solidFill>
+            <a:schemeClr val="bg1"/>
+          </a:solidFill>
+          <a:ln>
+            <a:solidFill>
+              <a:schemeClr val="bg1"/>
+            </a:solidFill>
+          </a:ln>
+        </p:spPr>
+        <p:style>
+          <a:lnRef idx="2">
+            <a:schemeClr val="accent1">
+              <a:shade val="50000"/>
+            </a:schemeClr>
+          </a:lnRef>
+          <a:fillRef idx="1">
+            <a:schemeClr val="accent1"/>
+          </a:fillRef>
+          <a:effectRef idx="0">
+            <a:schemeClr val="accent1"/>
+          </a:effectRef>
+          <a:fontRef idx="minor">
+            <a:schemeClr val="lt1"/>
+          </a:fontRef>
+        </p:style>
+        <p:txBody>
+          <a:bodyPr rtlCol="0" anchor="ctr"/>
+          <a:lstStyle/>
+          <a:p>
+            <a:pPr algn="ctr"/>
+            <a:endParaRPr lang="es-PE"/>
+          </a:p>
+        </p:txBody>
+      </p:sp>
+      <p:sp>
+        <p:nvSpPr>
+          <p:cNvPr id="8" name="Rectángulo 7"/>
+          <p:cNvSpPr/>
+          <p:nvPr/>
+        </p:nvSpPr>
+        <p:spPr>
+          <a:xfrm>
+            <a:off x="4014714" y="5306529"/>
+            <a:ext cx="5948151" cy="466474"/>
+          </a:xfrm>
+          <a:prstGeom prst="rect">
+            <a:avLst/>
+          </a:prstGeom>
+          <a:solidFill>
+            <a:schemeClr val="bg1"/>
+          </a:solidFill>
+          <a:ln>
+            <a:solidFill>
+              <a:schemeClr val="bg1"/>
+            </a:solidFill>
+          </a:ln>
+        </p:spPr>
+        <p:style>
+          <a:lnRef idx="2">
+            <a:schemeClr val="accent1">
+              <a:shade val="50000"/>
+            </a:schemeClr>
+          </a:lnRef>
+          <a:fillRef idx="1">
+            <a:schemeClr val="accent1"/>
+          </a:fillRef>
+          <a:effectRef idx="0">
+            <a:schemeClr val="accent1"/>
+          </a:effectRef>
+          <a:fontRef idx="minor">
+            <a:schemeClr val="lt1"/>
+          </a:fontRef>
+        </p:style>
+        <p:txBody>
+          <a:bodyPr rtlCol="0" anchor="ctr"/>
+          <a:lstStyle/>
+          <a:p>
+            <a:pPr algn="ctr"/>
+            <a:endParaRPr lang="es-PE"/>
+          </a:p>
+        </p:txBody>
+      </p:sp>
     </p:spTree>
     <p:extLst>
       <p:ext uri="{BB962C8B-B14F-4D97-AF65-F5344CB8AC3E}">
@@ -3935,8 +5784,80 @@
         </p:blipFill>
         <p:spPr>
           <a:xfrm>
-            <a:off x="1288732" y="2151834"/>
+            <a:off x="1070368" y="595989"/>
             <a:ext cx="10007066" cy="2080532"/>
+          </a:xfrm>
+          <a:prstGeom prst="rect">
+            <a:avLst/>
+          </a:prstGeom>
+        </p:spPr>
+      </p:pic>
+      <p:sp>
+        <p:nvSpPr>
+          <p:cNvPr id="3" name="Rectángulo 2"/>
+          <p:cNvSpPr/>
+          <p:nvPr/>
+        </p:nvSpPr>
+        <p:spPr>
+          <a:xfrm>
+            <a:off x="1070368" y="595989"/>
+            <a:ext cx="8414826" cy="362752"/>
+          </a:xfrm>
+          <a:prstGeom prst="rect">
+            <a:avLst/>
+          </a:prstGeom>
+          <a:solidFill>
+            <a:schemeClr val="bg1"/>
+          </a:solidFill>
+          <a:ln>
+            <a:solidFill>
+              <a:schemeClr val="bg1"/>
+            </a:solidFill>
+          </a:ln>
+        </p:spPr>
+        <p:style>
+          <a:lnRef idx="2">
+            <a:schemeClr val="accent1">
+              <a:shade val="50000"/>
+            </a:schemeClr>
+          </a:lnRef>
+          <a:fillRef idx="1">
+            <a:schemeClr val="accent1"/>
+          </a:fillRef>
+          <a:effectRef idx="0">
+            <a:schemeClr val="accent1"/>
+          </a:effectRef>
+          <a:fontRef idx="minor">
+            <a:schemeClr val="lt1"/>
+          </a:fontRef>
+        </p:style>
+        <p:txBody>
+          <a:bodyPr rtlCol="0" anchor="ctr"/>
+          <a:lstStyle/>
+          <a:p>
+            <a:pPr algn="ctr"/>
+            <a:endParaRPr lang="es-PE"/>
+          </a:p>
+        </p:txBody>
+      </p:sp>
+      <p:pic>
+        <p:nvPicPr>
+          <p:cNvPr id="2" name="Imagen 1"/>
+          <p:cNvPicPr>
+            <a:picLocks noChangeAspect="1"/>
+          </p:cNvPicPr>
+          <p:nvPr/>
+        </p:nvPicPr>
+        <p:blipFill>
+          <a:blip r:embed="rId3"/>
+          <a:stretch>
+            <a:fillRect/>
+          </a:stretch>
+        </p:blipFill>
+        <p:spPr>
+          <a:xfrm>
+            <a:off x="4498502" y="3016155"/>
+            <a:ext cx="3328985" cy="3236083"/>
           </a:xfrm>
           <a:prstGeom prst="rect">
             <a:avLst/>
@@ -4051,8 +5972,8 @@
         </p:nvSpPr>
         <p:spPr>
           <a:xfrm>
-            <a:off x="4258491" y="2769326"/>
-            <a:ext cx="4663440" cy="326571"/>
+            <a:off x="2404177" y="1884423"/>
+            <a:ext cx="6883514" cy="873525"/>
           </a:xfrm>
           <a:prstGeom prst="rect">
             <a:avLst/>
@@ -4089,6 +6010,102 @@
           </a:p>
         </p:txBody>
       </p:sp>
+      <p:pic>
+        <p:nvPicPr>
+          <p:cNvPr id="5" name="Imagen 4"/>
+          <p:cNvPicPr>
+            <a:picLocks noChangeAspect="1"/>
+          </p:cNvPicPr>
+          <p:nvPr/>
+        </p:nvPicPr>
+        <p:blipFill>
+          <a:blip r:embed="rId3"/>
+          <a:stretch>
+            <a:fillRect/>
+          </a:stretch>
+        </p:blipFill>
+        <p:spPr>
+          <a:xfrm>
+            <a:off x="356406" y="338598"/>
+            <a:ext cx="1676400" cy="2419350"/>
+          </a:xfrm>
+          <a:prstGeom prst="rect">
+            <a:avLst/>
+          </a:prstGeom>
+        </p:spPr>
+      </p:pic>
+      <p:pic>
+        <p:nvPicPr>
+          <p:cNvPr id="6" name="Imagen 5"/>
+          <p:cNvPicPr>
+            <a:picLocks noChangeAspect="1"/>
+          </p:cNvPicPr>
+          <p:nvPr/>
+        </p:nvPicPr>
+        <p:blipFill>
+          <a:blip r:embed="rId4"/>
+          <a:stretch>
+            <a:fillRect/>
+          </a:stretch>
+        </p:blipFill>
+        <p:spPr>
+          <a:xfrm>
+            <a:off x="349354" y="3428029"/>
+            <a:ext cx="1683451" cy="2132371"/>
+          </a:xfrm>
+          <a:prstGeom prst="rect">
+            <a:avLst/>
+          </a:prstGeom>
+        </p:spPr>
+      </p:pic>
+      <p:pic>
+        <p:nvPicPr>
+          <p:cNvPr id="7" name="Imagen 6"/>
+          <p:cNvPicPr>
+            <a:picLocks noChangeAspect="1"/>
+          </p:cNvPicPr>
+          <p:nvPr/>
+        </p:nvPicPr>
+        <p:blipFill>
+          <a:blip r:embed="rId5"/>
+          <a:stretch>
+            <a:fillRect/>
+          </a:stretch>
+        </p:blipFill>
+        <p:spPr>
+          <a:xfrm>
+            <a:off x="9751129" y="456585"/>
+            <a:ext cx="1600627" cy="2301363"/>
+          </a:xfrm>
+          <a:prstGeom prst="rect">
+            <a:avLst/>
+          </a:prstGeom>
+        </p:spPr>
+      </p:pic>
+      <p:pic>
+        <p:nvPicPr>
+          <p:cNvPr id="8" name="Imagen 7"/>
+          <p:cNvPicPr>
+            <a:picLocks noChangeAspect="1"/>
+          </p:cNvPicPr>
+          <p:nvPr/>
+        </p:nvPicPr>
+        <p:blipFill>
+          <a:blip r:embed="rId6"/>
+          <a:stretch>
+            <a:fillRect/>
+          </a:stretch>
+        </p:blipFill>
+        <p:spPr>
+          <a:xfrm>
+            <a:off x="9575129" y="3669485"/>
+            <a:ext cx="1952625" cy="1838325"/>
+          </a:xfrm>
+          <a:prstGeom prst="rect">
+            <a:avLst/>
+          </a:prstGeom>
+        </p:spPr>
+      </p:pic>
     </p:spTree>
     <p:extLst>
       <p:ext uri="{BB962C8B-B14F-4D97-AF65-F5344CB8AC3E}">
@@ -4135,8 +6152,32 @@
         </p:blipFill>
         <p:spPr>
           <a:xfrm>
-            <a:off x="3449002" y="2567531"/>
+            <a:off x="3166165" y="4160357"/>
             <a:ext cx="5199831" cy="1116194"/>
+          </a:xfrm>
+          <a:prstGeom prst="rect">
+            <a:avLst/>
+          </a:prstGeom>
+        </p:spPr>
+      </p:pic>
+      <p:pic>
+        <p:nvPicPr>
+          <p:cNvPr id="3" name="Imagen 2"/>
+          <p:cNvPicPr>
+            <a:picLocks noChangeAspect="1"/>
+          </p:cNvPicPr>
+          <p:nvPr/>
+        </p:nvPicPr>
+        <p:blipFill>
+          <a:blip r:embed="rId3"/>
+          <a:stretch>
+            <a:fillRect/>
+          </a:stretch>
+        </p:blipFill>
+        <p:spPr>
+          <a:xfrm>
+            <a:off x="4187464" y="922849"/>
+            <a:ext cx="3157231" cy="2117500"/>
           </a:xfrm>
           <a:prstGeom prst="rect">
             <a:avLst/>
@@ -4189,8 +6230,126 @@
         </p:blipFill>
         <p:spPr>
           <a:xfrm>
-            <a:off x="1869349" y="851399"/>
+            <a:off x="704226" y="880896"/>
             <a:ext cx="8255910" cy="4739504"/>
+          </a:xfrm>
+          <a:prstGeom prst="rect">
+            <a:avLst/>
+          </a:prstGeom>
+        </p:spPr>
+      </p:pic>
+      <p:sp>
+        <p:nvSpPr>
+          <p:cNvPr id="3" name="Rectángulo 2"/>
+          <p:cNvSpPr/>
+          <p:nvPr/>
+        </p:nvSpPr>
+        <p:spPr>
+          <a:xfrm>
+            <a:off x="870154" y="880896"/>
+            <a:ext cx="2182763" cy="447507"/>
+          </a:xfrm>
+          <a:prstGeom prst="rect">
+            <a:avLst/>
+          </a:prstGeom>
+          <a:solidFill>
+            <a:schemeClr val="bg1"/>
+          </a:solidFill>
+          <a:ln>
+            <a:solidFill>
+              <a:schemeClr val="bg1"/>
+            </a:solidFill>
+          </a:ln>
+        </p:spPr>
+        <p:style>
+          <a:lnRef idx="2">
+            <a:schemeClr val="accent1">
+              <a:shade val="50000"/>
+            </a:schemeClr>
+          </a:lnRef>
+          <a:fillRef idx="1">
+            <a:schemeClr val="accent1"/>
+          </a:fillRef>
+          <a:effectRef idx="0">
+            <a:schemeClr val="accent1"/>
+          </a:effectRef>
+          <a:fontRef idx="minor">
+            <a:schemeClr val="lt1"/>
+          </a:fontRef>
+        </p:style>
+        <p:txBody>
+          <a:bodyPr rtlCol="0" anchor="ctr"/>
+          <a:lstStyle/>
+          <a:p>
+            <a:pPr algn="ctr"/>
+            <a:endParaRPr lang="es-PE"/>
+          </a:p>
+        </p:txBody>
+      </p:sp>
+      <p:sp>
+        <p:nvSpPr>
+          <p:cNvPr id="4" name="Rectángulo 3"/>
+          <p:cNvSpPr/>
+          <p:nvPr/>
+        </p:nvSpPr>
+        <p:spPr>
+          <a:xfrm>
+            <a:off x="870154" y="3628103"/>
+            <a:ext cx="7949381" cy="648929"/>
+          </a:xfrm>
+          <a:prstGeom prst="rect">
+            <a:avLst/>
+          </a:prstGeom>
+          <a:noFill/>
+          <a:ln>
+            <a:solidFill>
+              <a:srgbClr val="FF0000"/>
+            </a:solidFill>
+          </a:ln>
+        </p:spPr>
+        <p:style>
+          <a:lnRef idx="2">
+            <a:schemeClr val="accent1">
+              <a:shade val="50000"/>
+            </a:schemeClr>
+          </a:lnRef>
+          <a:fillRef idx="1">
+            <a:schemeClr val="accent1"/>
+          </a:fillRef>
+          <a:effectRef idx="0">
+            <a:schemeClr val="accent1"/>
+          </a:effectRef>
+          <a:fontRef idx="minor">
+            <a:schemeClr val="lt1"/>
+          </a:fontRef>
+        </p:style>
+        <p:txBody>
+          <a:bodyPr rtlCol="0" anchor="ctr"/>
+          <a:lstStyle/>
+          <a:p>
+            <a:pPr algn="ctr"/>
+            <a:endParaRPr lang="es-PE"/>
+          </a:p>
+        </p:txBody>
+      </p:sp>
+      <p:pic>
+        <p:nvPicPr>
+          <p:cNvPr id="5" name="Imagen 4"/>
+          <p:cNvPicPr>
+            <a:picLocks noChangeAspect="1"/>
+          </p:cNvPicPr>
+          <p:nvPr/>
+        </p:nvPicPr>
+        <p:blipFill>
+          <a:blip r:embed="rId3"/>
+          <a:stretch>
+            <a:fillRect/>
+          </a:stretch>
+        </p:blipFill>
+        <p:spPr>
+          <a:xfrm>
+            <a:off x="8985463" y="1328403"/>
+            <a:ext cx="2912034" cy="3688577"/>
           </a:xfrm>
           <a:prstGeom prst="rect">
             <a:avLst/>
@@ -4275,6 +6434,100 @@
           </a:prstGeom>
         </p:spPr>
       </p:pic>
+      <p:sp>
+        <p:nvSpPr>
+          <p:cNvPr id="6" name="Rectángulo 5"/>
+          <p:cNvSpPr/>
+          <p:nvPr/>
+        </p:nvSpPr>
+        <p:spPr>
+          <a:xfrm>
+            <a:off x="1167015" y="522379"/>
+            <a:ext cx="6752869" cy="333028"/>
+          </a:xfrm>
+          <a:prstGeom prst="rect">
+            <a:avLst/>
+          </a:prstGeom>
+          <a:solidFill>
+            <a:schemeClr val="bg1"/>
+          </a:solidFill>
+          <a:ln>
+            <a:solidFill>
+              <a:schemeClr val="bg1"/>
+            </a:solidFill>
+          </a:ln>
+        </p:spPr>
+        <p:style>
+          <a:lnRef idx="2">
+            <a:schemeClr val="accent1">
+              <a:shade val="50000"/>
+            </a:schemeClr>
+          </a:lnRef>
+          <a:fillRef idx="1">
+            <a:schemeClr val="accent1"/>
+          </a:fillRef>
+          <a:effectRef idx="0">
+            <a:schemeClr val="accent1"/>
+          </a:effectRef>
+          <a:fontRef idx="minor">
+            <a:schemeClr val="lt1"/>
+          </a:fontRef>
+        </p:style>
+        <p:txBody>
+          <a:bodyPr rtlCol="0" anchor="ctr"/>
+          <a:lstStyle/>
+          <a:p>
+            <a:pPr algn="ctr"/>
+            <a:endParaRPr lang="es-PE"/>
+          </a:p>
+        </p:txBody>
+      </p:sp>
+      <p:sp>
+        <p:nvSpPr>
+          <p:cNvPr id="7" name="Rectángulo 6"/>
+          <p:cNvSpPr/>
+          <p:nvPr/>
+        </p:nvSpPr>
+        <p:spPr>
+          <a:xfrm>
+            <a:off x="1167015" y="4571999"/>
+            <a:ext cx="9581065" cy="1610109"/>
+          </a:xfrm>
+          <a:prstGeom prst="rect">
+            <a:avLst/>
+          </a:prstGeom>
+          <a:noFill/>
+          <a:ln>
+            <a:solidFill>
+              <a:srgbClr val="FF0000"/>
+            </a:solidFill>
+          </a:ln>
+        </p:spPr>
+        <p:style>
+          <a:lnRef idx="2">
+            <a:schemeClr val="accent1">
+              <a:shade val="50000"/>
+            </a:schemeClr>
+          </a:lnRef>
+          <a:fillRef idx="1">
+            <a:schemeClr val="accent1"/>
+          </a:fillRef>
+          <a:effectRef idx="0">
+            <a:schemeClr val="accent1"/>
+          </a:effectRef>
+          <a:fontRef idx="minor">
+            <a:schemeClr val="lt1"/>
+          </a:fontRef>
+        </p:style>
+        <p:txBody>
+          <a:bodyPr rtlCol="0" anchor="ctr"/>
+          <a:lstStyle/>
+          <a:p>
+            <a:pPr algn="ctr"/>
+            <a:endParaRPr lang="es-PE"/>
+          </a:p>
+        </p:txBody>
+      </p:sp>
     </p:spTree>
     <p:extLst>
       <p:ext uri="{BB962C8B-B14F-4D97-AF65-F5344CB8AC3E}">
@@ -4323,6 +6576,78 @@
           <a:xfrm>
             <a:off x="845683" y="1342889"/>
             <a:ext cx="10388848" cy="2811100"/>
+          </a:xfrm>
+          <a:prstGeom prst="rect">
+            <a:avLst/>
+          </a:prstGeom>
+        </p:spPr>
+      </p:pic>
+      <p:sp>
+        <p:nvSpPr>
+          <p:cNvPr id="3" name="Rectángulo 2"/>
+          <p:cNvSpPr/>
+          <p:nvPr/>
+        </p:nvSpPr>
+        <p:spPr>
+          <a:xfrm>
+            <a:off x="7152968" y="3672348"/>
+            <a:ext cx="3805084" cy="481641"/>
+          </a:xfrm>
+          <a:prstGeom prst="rect">
+            <a:avLst/>
+          </a:prstGeom>
+          <a:solidFill>
+            <a:schemeClr val="bg1"/>
+          </a:solidFill>
+          <a:ln>
+            <a:solidFill>
+              <a:schemeClr val="bg1"/>
+            </a:solidFill>
+          </a:ln>
+        </p:spPr>
+        <p:style>
+          <a:lnRef idx="2">
+            <a:schemeClr val="accent1">
+              <a:shade val="50000"/>
+            </a:schemeClr>
+          </a:lnRef>
+          <a:fillRef idx="1">
+            <a:schemeClr val="accent1"/>
+          </a:fillRef>
+          <a:effectRef idx="0">
+            <a:schemeClr val="accent1"/>
+          </a:effectRef>
+          <a:fontRef idx="minor">
+            <a:schemeClr val="lt1"/>
+          </a:fontRef>
+        </p:style>
+        <p:txBody>
+          <a:bodyPr rtlCol="0" anchor="ctr"/>
+          <a:lstStyle/>
+          <a:p>
+            <a:pPr algn="ctr"/>
+            <a:endParaRPr lang="es-PE"/>
+          </a:p>
+        </p:txBody>
+      </p:sp>
+      <p:pic>
+        <p:nvPicPr>
+          <p:cNvPr id="4" name="Imagen 3"/>
+          <p:cNvPicPr>
+            <a:picLocks noChangeAspect="1"/>
+          </p:cNvPicPr>
+          <p:nvPr/>
+        </p:nvPicPr>
+        <p:blipFill>
+          <a:blip r:embed="rId3"/>
+          <a:stretch>
+            <a:fillRect/>
+          </a:stretch>
+        </p:blipFill>
+        <p:spPr>
+          <a:xfrm>
+            <a:off x="4885557" y="4468454"/>
+            <a:ext cx="2066925" cy="1962150"/>
           </a:xfrm>
           <a:prstGeom prst="rect">
             <a:avLst/>
@@ -4407,6 +6732,154 @@
           </a:prstGeom>
         </p:spPr>
       </p:pic>
+      <p:sp>
+        <p:nvSpPr>
+          <p:cNvPr id="3" name="Rectángulo 2"/>
+          <p:cNvSpPr/>
+          <p:nvPr/>
+        </p:nvSpPr>
+        <p:spPr>
+          <a:xfrm>
+            <a:off x="1832475" y="210230"/>
+            <a:ext cx="7680235" cy="1736557"/>
+          </a:xfrm>
+          <a:prstGeom prst="rect">
+            <a:avLst/>
+          </a:prstGeom>
+          <a:noFill/>
+          <a:ln>
+            <a:solidFill>
+              <a:srgbClr val="FF0000"/>
+            </a:solidFill>
+          </a:ln>
+        </p:spPr>
+        <p:style>
+          <a:lnRef idx="2">
+            <a:schemeClr val="accent1">
+              <a:shade val="50000"/>
+            </a:schemeClr>
+          </a:lnRef>
+          <a:fillRef idx="1">
+            <a:schemeClr val="accent1"/>
+          </a:fillRef>
+          <a:effectRef idx="0">
+            <a:schemeClr val="accent1"/>
+          </a:effectRef>
+          <a:fontRef idx="minor">
+            <a:schemeClr val="lt1"/>
+          </a:fontRef>
+        </p:style>
+        <p:txBody>
+          <a:bodyPr rtlCol="0" anchor="ctr"/>
+          <a:lstStyle/>
+          <a:p>
+            <a:pPr algn="ctr"/>
+            <a:endParaRPr lang="es-PE"/>
+          </a:p>
+        </p:txBody>
+      </p:sp>
+      <p:sp>
+        <p:nvSpPr>
+          <p:cNvPr id="5" name="Rectángulo 4"/>
+          <p:cNvSpPr/>
+          <p:nvPr/>
+        </p:nvSpPr>
+        <p:spPr>
+          <a:xfrm>
+            <a:off x="2005781" y="3333135"/>
+            <a:ext cx="7639664" cy="1873046"/>
+          </a:xfrm>
+          <a:prstGeom prst="rect">
+            <a:avLst/>
+          </a:prstGeom>
+          <a:noFill/>
+          <a:ln>
+            <a:solidFill>
+              <a:srgbClr val="FF0000"/>
+            </a:solidFill>
+          </a:ln>
+        </p:spPr>
+        <p:style>
+          <a:lnRef idx="2">
+            <a:schemeClr val="accent1">
+              <a:shade val="50000"/>
+            </a:schemeClr>
+          </a:lnRef>
+          <a:fillRef idx="1">
+            <a:schemeClr val="accent1"/>
+          </a:fillRef>
+          <a:effectRef idx="0">
+            <a:schemeClr val="accent1"/>
+          </a:effectRef>
+          <a:fontRef idx="minor">
+            <a:schemeClr val="lt1"/>
+          </a:fontRef>
+        </p:style>
+        <p:txBody>
+          <a:bodyPr rot="0" spcFirstLastPara="0" vertOverflow="overflow" horzOverflow="overflow" vert="horz" wrap="square" lIns="91440" tIns="45720" rIns="91440" bIns="45720" numCol="1" spcCol="0" rtlCol="0" fromWordArt="0" anchor="ctr" anchorCtr="0" forceAA="0" compatLnSpc="1">
+            <a:prstTxWarp prst="textNoShape">
+              <a:avLst/>
+            </a:prstTxWarp>
+            <a:noAutofit/>
+          </a:bodyPr>
+          <a:lstStyle/>
+          <a:p>
+            <a:pPr algn="ctr"/>
+            <a:endParaRPr lang="es-PE"/>
+          </a:p>
+        </p:txBody>
+      </p:sp>
+      <p:sp>
+        <p:nvSpPr>
+          <p:cNvPr id="6" name="Rectángulo 5"/>
+          <p:cNvSpPr/>
+          <p:nvPr/>
+        </p:nvSpPr>
+        <p:spPr>
+          <a:xfrm>
+            <a:off x="2005780" y="4297679"/>
+            <a:ext cx="7639665" cy="908501"/>
+          </a:xfrm>
+          <a:prstGeom prst="rect">
+            <a:avLst/>
+          </a:prstGeom>
+          <a:noFill/>
+          <a:ln w="57150">
+            <a:solidFill>
+              <a:srgbClr val="FF0000"/>
+            </a:solidFill>
+          </a:ln>
+        </p:spPr>
+        <p:style>
+          <a:lnRef idx="2">
+            <a:schemeClr val="accent1">
+              <a:shade val="50000"/>
+            </a:schemeClr>
+          </a:lnRef>
+          <a:fillRef idx="1">
+            <a:schemeClr val="accent1"/>
+          </a:fillRef>
+          <a:effectRef idx="0">
+            <a:schemeClr val="accent1"/>
+          </a:effectRef>
+          <a:fontRef idx="minor">
+            <a:schemeClr val="lt1"/>
+          </a:fontRef>
+        </p:style>
+        <p:txBody>
+          <a:bodyPr rot="0" spcFirstLastPara="0" vertOverflow="overflow" horzOverflow="overflow" vert="horz" wrap="square" lIns="91440" tIns="45720" rIns="91440" bIns="45720" numCol="1" spcCol="0" rtlCol="0" fromWordArt="0" anchor="ctr" anchorCtr="0" forceAA="0" compatLnSpc="1">
+            <a:prstTxWarp prst="textNoShape">
+              <a:avLst/>
+            </a:prstTxWarp>
+            <a:noAutofit/>
+          </a:bodyPr>
+          <a:lstStyle/>
+          <a:p>
+            <a:pPr algn="ctr"/>
+            <a:endParaRPr lang="es-PE" sz="2000"/>
+          </a:p>
+        </p:txBody>
+      </p:sp>
     </p:spTree>
     <p:extLst>
       <p:ext uri="{BB962C8B-B14F-4D97-AF65-F5344CB8AC3E}">
@@ -4507,6 +6980,81 @@
           </a:p>
         </p:txBody>
       </p:sp>
+      <p:sp>
+        <p:nvSpPr>
+          <p:cNvPr id="2" name="Rectángulo 1"/>
+          <p:cNvSpPr/>
+          <p:nvPr/>
+        </p:nvSpPr>
+        <p:spPr>
+          <a:xfrm>
+            <a:off x="1632857" y="2756263"/>
+            <a:ext cx="9130937" cy="1854926"/>
+          </a:xfrm>
+          <a:prstGeom prst="rect">
+            <a:avLst/>
+          </a:prstGeom>
+          <a:noFill/>
+          <a:ln>
+            <a:solidFill>
+              <a:srgbClr val="FF0000"/>
+            </a:solidFill>
+          </a:ln>
+        </p:spPr>
+        <p:style>
+          <a:lnRef idx="2">
+            <a:schemeClr val="accent1">
+              <a:shade val="50000"/>
+            </a:schemeClr>
+          </a:lnRef>
+          <a:fillRef idx="1">
+            <a:schemeClr val="accent1"/>
+          </a:fillRef>
+          <a:effectRef idx="0">
+            <a:schemeClr val="accent1"/>
+          </a:effectRef>
+          <a:fontRef idx="minor">
+            <a:schemeClr val="lt1"/>
+          </a:fontRef>
+        </p:style>
+        <p:txBody>
+          <a:bodyPr rot="0" spcFirstLastPara="0" vertOverflow="overflow" horzOverflow="overflow" vert="horz" wrap="square" lIns="91440" tIns="45720" rIns="91440" bIns="45720" numCol="1" spcCol="0" rtlCol="0" fromWordArt="0" anchor="ctr" anchorCtr="0" forceAA="0" compatLnSpc="1">
+            <a:prstTxWarp prst="textNoShape">
+              <a:avLst/>
+            </a:prstTxWarp>
+            <a:noAutofit/>
+          </a:bodyPr>
+          <a:lstStyle/>
+          <a:p>
+            <a:pPr algn="ctr"/>
+            <a:endParaRPr lang="es-PE"/>
+          </a:p>
+        </p:txBody>
+      </p:sp>
+      <p:pic>
+        <p:nvPicPr>
+          <p:cNvPr id="5" name="Imagen 4"/>
+          <p:cNvPicPr>
+            <a:picLocks noChangeAspect="1"/>
+          </p:cNvPicPr>
+          <p:nvPr/>
+        </p:nvPicPr>
+        <p:blipFill>
+          <a:blip r:embed="rId3"/>
+          <a:stretch>
+            <a:fillRect/>
+          </a:stretch>
+        </p:blipFill>
+        <p:spPr>
+          <a:xfrm>
+            <a:off x="11011698" y="816887"/>
+            <a:ext cx="907868" cy="1218009"/>
+          </a:xfrm>
+          <a:prstGeom prst="rect">
+            <a:avLst/>
+          </a:prstGeom>
+        </p:spPr>
+      </p:pic>
     </p:spTree>
     <p:extLst>
       <p:ext uri="{BB962C8B-B14F-4D97-AF65-F5344CB8AC3E}">
@@ -4771,7 +7319,40 @@
       </a:bgFillStyleLst>
     </a:fmtScheme>
   </a:themeElements>
-  <a:objectDefaults/>
+  <a:objectDefaults>
+    <a:spDef>
+      <a:spPr>
+        <a:noFill/>
+        <a:ln>
+          <a:solidFill>
+            <a:srgbClr val="FF0000"/>
+          </a:solidFill>
+        </a:ln>
+      </a:spPr>
+      <a:bodyPr rtlCol="0" anchor="ctr"/>
+      <a:lstStyle>
+        <a:defPPr algn="ctr">
+          <a:defRPr/>
+        </a:defPPr>
+      </a:lstStyle>
+      <a:style>
+        <a:lnRef idx="2">
+          <a:schemeClr val="accent1">
+            <a:shade val="50000"/>
+          </a:schemeClr>
+        </a:lnRef>
+        <a:fillRef idx="1">
+          <a:schemeClr val="accent1"/>
+        </a:fillRef>
+        <a:effectRef idx="0">
+          <a:schemeClr val="accent1"/>
+        </a:effectRef>
+        <a:fontRef idx="minor">
+          <a:schemeClr val="lt1"/>
+        </a:fontRef>
+      </a:style>
+    </a:spDef>
+  </a:objectDefaults>
   <a:extraClrSchemeLst/>
   <a:extLst>
     <a:ext uri="{05A4C25C-085E-4340-85A3-A5531E510DB2}">

</xml_diff>